<commit_message>
Add sin-theta estimation summary
</commit_message>
<xml_diff>
--- a/circle/circle.pptx
+++ b/circle/circle.pptx
@@ -260,7 +260,7 @@
           <a:p>
             <a:fld id="{53864993-EA4D-4CF9-A73F-F1EAD087F599}" type="datetimeFigureOut">
               <a:rPr kumimoji="1" lang="ja-JP" altLang="en-US" smtClean="0"/>
-              <a:t>2019/8/16</a:t>
+              <a:t>2019/8/19</a:t>
             </a:fld>
             <a:endParaRPr kumimoji="1" lang="ja-JP" altLang="en-US"/>
           </a:p>
@@ -490,7 +490,7 @@
           <a:p>
             <a:fld id="{53864993-EA4D-4CF9-A73F-F1EAD087F599}" type="datetimeFigureOut">
               <a:rPr kumimoji="1" lang="ja-JP" altLang="en-US" smtClean="0"/>
-              <a:t>2019/8/16</a:t>
+              <a:t>2019/8/19</a:t>
             </a:fld>
             <a:endParaRPr kumimoji="1" lang="ja-JP" altLang="en-US"/>
           </a:p>
@@ -730,7 +730,7 @@
           <a:p>
             <a:fld id="{53864993-EA4D-4CF9-A73F-F1EAD087F599}" type="datetimeFigureOut">
               <a:rPr kumimoji="1" lang="ja-JP" altLang="en-US" smtClean="0"/>
-              <a:t>2019/8/16</a:t>
+              <a:t>2019/8/19</a:t>
             </a:fld>
             <a:endParaRPr kumimoji="1" lang="ja-JP" altLang="en-US"/>
           </a:p>
@@ -960,7 +960,7 @@
           <a:p>
             <a:fld id="{53864993-EA4D-4CF9-A73F-F1EAD087F599}" type="datetimeFigureOut">
               <a:rPr kumimoji="1" lang="ja-JP" altLang="en-US" smtClean="0"/>
-              <a:t>2019/8/16</a:t>
+              <a:t>2019/8/19</a:t>
             </a:fld>
             <a:endParaRPr kumimoji="1" lang="ja-JP" altLang="en-US"/>
           </a:p>
@@ -1235,7 +1235,7 @@
           <a:p>
             <a:fld id="{53864993-EA4D-4CF9-A73F-F1EAD087F599}" type="datetimeFigureOut">
               <a:rPr kumimoji="1" lang="ja-JP" altLang="en-US" smtClean="0"/>
-              <a:t>2019/8/16</a:t>
+              <a:t>2019/8/19</a:t>
             </a:fld>
             <a:endParaRPr kumimoji="1" lang="ja-JP" altLang="en-US"/>
           </a:p>
@@ -1564,7 +1564,7 @@
           <a:p>
             <a:fld id="{53864993-EA4D-4CF9-A73F-F1EAD087F599}" type="datetimeFigureOut">
               <a:rPr kumimoji="1" lang="ja-JP" altLang="en-US" smtClean="0"/>
-              <a:t>2019/8/16</a:t>
+              <a:t>2019/8/19</a:t>
             </a:fld>
             <a:endParaRPr kumimoji="1" lang="ja-JP" altLang="en-US"/>
           </a:p>
@@ -2040,7 +2040,7 @@
           <a:p>
             <a:fld id="{53864993-EA4D-4CF9-A73F-F1EAD087F599}" type="datetimeFigureOut">
               <a:rPr kumimoji="1" lang="ja-JP" altLang="en-US" smtClean="0"/>
-              <a:t>2019/8/16</a:t>
+              <a:t>2019/8/19</a:t>
             </a:fld>
             <a:endParaRPr kumimoji="1" lang="ja-JP" altLang="en-US"/>
           </a:p>
@@ -2181,7 +2181,7 @@
           <a:p>
             <a:fld id="{53864993-EA4D-4CF9-A73F-F1EAD087F599}" type="datetimeFigureOut">
               <a:rPr kumimoji="1" lang="ja-JP" altLang="en-US" smtClean="0"/>
-              <a:t>2019/8/16</a:t>
+              <a:t>2019/8/19</a:t>
             </a:fld>
             <a:endParaRPr kumimoji="1" lang="ja-JP" altLang="en-US"/>
           </a:p>
@@ -2294,7 +2294,7 @@
           <a:p>
             <a:fld id="{53864993-EA4D-4CF9-A73F-F1EAD087F599}" type="datetimeFigureOut">
               <a:rPr kumimoji="1" lang="ja-JP" altLang="en-US" smtClean="0"/>
-              <a:t>2019/8/16</a:t>
+              <a:t>2019/8/19</a:t>
             </a:fld>
             <a:endParaRPr kumimoji="1" lang="ja-JP" altLang="en-US"/>
           </a:p>
@@ -2637,7 +2637,7 @@
           <a:p>
             <a:fld id="{53864993-EA4D-4CF9-A73F-F1EAD087F599}" type="datetimeFigureOut">
               <a:rPr kumimoji="1" lang="ja-JP" altLang="en-US" smtClean="0"/>
-              <a:t>2019/8/16</a:t>
+              <a:t>2019/8/19</a:t>
             </a:fld>
             <a:endParaRPr kumimoji="1" lang="ja-JP" altLang="en-US"/>
           </a:p>
@@ -2925,7 +2925,7 @@
           <a:p>
             <a:fld id="{53864993-EA4D-4CF9-A73F-F1EAD087F599}" type="datetimeFigureOut">
               <a:rPr kumimoji="1" lang="ja-JP" altLang="en-US" smtClean="0"/>
-              <a:t>2019/8/16</a:t>
+              <a:t>2019/8/19</a:t>
             </a:fld>
             <a:endParaRPr kumimoji="1" lang="ja-JP" altLang="en-US"/>
           </a:p>
@@ -3198,7 +3198,7 @@
           <a:p>
             <a:fld id="{53864993-EA4D-4CF9-A73F-F1EAD087F599}" type="datetimeFigureOut">
               <a:rPr kumimoji="1" lang="ja-JP" altLang="en-US" smtClean="0"/>
-              <a:t>2019/8/16</a:t>
+              <a:t>2019/8/19</a:t>
             </a:fld>
             <a:endParaRPr kumimoji="1" lang="ja-JP" altLang="en-US"/>
           </a:p>
@@ -6045,7 +6045,7 @@
         <p:spPr>
           <a:xfrm>
             <a:off x="1073039" y="1524217"/>
-            <a:ext cx="3173946" cy="830997"/>
+            <a:ext cx="4071627" cy="830997"/>
           </a:xfrm>
           <a:prstGeom prst="rect">
             <a:avLst/>
@@ -6070,43 +6070,27 @@
               <a:t> = </a:t>
             </a:r>
             <a:r>
+              <a:rPr lang="en-US" altLang="ja-JP" dirty="0" err="1" smtClean="0"/>
+              <a:t>arcsin</a:t>
+            </a:r>
+            <a:r>
               <a:rPr lang="en-US" altLang="ja-JP" dirty="0" smtClean="0"/>
-              <a:t>-</a:t>
-            </a:r>
-            <a:r>
-              <a:rPr lang="en-US" altLang="ja-JP" dirty="0"/>
-              <a:t>0.08390354 </a:t>
-            </a:r>
-            <a:r>
-              <a:rPr lang="en-US" altLang="ja-JP" dirty="0"/>
-              <a:t>* </a:t>
-            </a:r>
-            <a:r>
-              <a:rPr lang="en-US" altLang="ja-JP" dirty="0" err="1"/>
+              <a:t>(</a:t>
+            </a:r>
+            <a:r>
+              <a:rPr lang="en-US" altLang="ja-JP" dirty="0" smtClean="0"/>
+              <a:t>-0.00143584 * </a:t>
+            </a:r>
+            <a:r>
+              <a:rPr lang="en-US" altLang="ja-JP" dirty="0" err="1" smtClean="0"/>
               <a:t>circle_x</a:t>
             </a:r>
-            <a:endParaRPr lang="en-US" altLang="ja-JP" dirty="0"/>
-          </a:p>
-          <a:p>
-            <a:r>
-              <a:rPr lang="en-US" altLang="ja-JP" dirty="0"/>
-              <a:t>  </a:t>
-            </a:r>
-            <a:r>
-              <a:rPr lang="en-US" altLang="ja-JP" dirty="0"/>
-              <a:t> </a:t>
-            </a:r>
+            <a:endParaRPr lang="en-US" altLang="ja-JP" dirty="0" smtClean="0"/>
+          </a:p>
+          <a:p>
             <a:r>
               <a:rPr lang="en-US" altLang="ja-JP" dirty="0" smtClean="0"/>
-              <a:t>+ 26.03749234111076 [</a:t>
-            </a:r>
-            <a:r>
-              <a:rPr lang="en-US" altLang="ja-JP" dirty="0" err="1" smtClean="0"/>
-              <a:t>deg</a:t>
-            </a:r>
-            <a:r>
-              <a:rPr lang="en-US" altLang="ja-JP" dirty="0" smtClean="0"/>
-              <a:t>]</a:t>
+              <a:t>              + 0.4458366274811388) [rad]</a:t>
             </a:r>
             <a:endParaRPr lang="en-US" altLang="ja-JP" dirty="0"/>
           </a:p>
@@ -6126,7 +6110,7 @@
         </p:nvSpPr>
         <p:spPr>
           <a:xfrm>
-            <a:off x="1073039" y="4417327"/>
+            <a:off x="1073039" y="2467229"/>
             <a:ext cx="3999493" cy="276999"/>
           </a:xfrm>
           <a:prstGeom prst="rect">
@@ -6186,7 +6170,7 @@
         </p:nvSpPr>
         <p:spPr>
           <a:xfrm>
-            <a:off x="1073039" y="2555274"/>
+            <a:off x="1073039" y="2974874"/>
             <a:ext cx="3350276" cy="1661993"/>
           </a:xfrm>
           <a:prstGeom prst="rect">
@@ -7139,7 +7123,7 @@
         </p:nvSpPr>
         <p:spPr>
           <a:xfrm>
-            <a:off x="5640224" y="1524217"/>
+            <a:off x="5640224" y="3324442"/>
             <a:ext cx="2537554" cy="830997"/>
           </a:xfrm>
           <a:prstGeom prst="rect">
@@ -7192,7 +7176,7 @@
         </p:nvSpPr>
         <p:spPr>
           <a:xfrm>
-            <a:off x="5640224" y="4417327"/>
+            <a:off x="5640224" y="4267453"/>
             <a:ext cx="6094617" cy="276999"/>
           </a:xfrm>
           <a:prstGeom prst="rect">
@@ -7235,10 +7219,74 @@
       </p:sp>
       <p:sp>
         <p:nvSpPr>
-          <p:cNvPr id="16" name="テキスト ボックス 15">
-            <a:extLst>
-              <a:ext uri="{FF2B5EF4-FFF2-40B4-BE49-F238E27FC236}">
-                <a16:creationId xmlns:a16="http://schemas.microsoft.com/office/drawing/2014/main" id="{0E186082-22E0-4C33-B4D2-587200767D30}"/>
+          <p:cNvPr id="3" name="正方形/長方形 2"/>
+          <p:cNvSpPr/>
+          <p:nvPr/>
+        </p:nvSpPr>
+        <p:spPr>
+          <a:xfrm>
+            <a:off x="5395784" y="3048000"/>
+            <a:ext cx="6532605" cy="1695403"/>
+          </a:xfrm>
+          <a:prstGeom prst="rect">
+            <a:avLst/>
+          </a:prstGeom>
+          <a:solidFill>
+            <a:srgbClr val="A5A5A5">
+              <a:alpha val="50196"/>
+            </a:srgbClr>
+          </a:solidFill>
+        </p:spPr>
+        <p:style>
+          <a:lnRef idx="2">
+            <a:schemeClr val="accent3">
+              <a:shade val="50000"/>
+            </a:schemeClr>
+          </a:lnRef>
+          <a:fillRef idx="1">
+            <a:schemeClr val="accent3"/>
+          </a:fillRef>
+          <a:effectRef idx="0">
+            <a:schemeClr val="accent3"/>
+          </a:effectRef>
+          <a:fontRef idx="minor">
+            <a:schemeClr val="lt1"/>
+          </a:fontRef>
+        </p:style>
+        <p:txBody>
+          <a:bodyPr rtlCol="0" anchor="t" anchorCtr="0"/>
+          <a:lstStyle/>
+          <a:p>
+            <a:r>
+              <a:rPr lang="ja-JP" altLang="en-US" dirty="0" smtClean="0"/>
+              <a:t>↑の</a:t>
+            </a:r>
+            <a:r>
+              <a:rPr lang="ja-JP" altLang="en-US" dirty="0"/>
+              <a:t>方</a:t>
+            </a:r>
+            <a:r>
+              <a:rPr lang="ja-JP" altLang="en-US" dirty="0" smtClean="0"/>
+              <a:t>が</a:t>
+            </a:r>
+            <a:r>
+              <a:rPr lang="en-US" altLang="ja-JP" dirty="0" err="1" smtClean="0"/>
+              <a:t>enemy_θ</a:t>
+            </a:r>
+            <a:r>
+              <a:rPr lang="ja-JP" altLang="en-US" dirty="0" smtClean="0"/>
+              <a:t>の誤差が安定している</a:t>
+            </a:r>
+            <a:endParaRPr kumimoji="1" lang="ja-JP" altLang="en-US" dirty="0"/>
+          </a:p>
+        </p:txBody>
+      </p:sp>
+      <p:sp>
+        <p:nvSpPr>
+          <p:cNvPr id="17" name="テキスト ボックス 16">
+            <a:extLst>
+              <a:ext uri="{FF2B5EF4-FFF2-40B4-BE49-F238E27FC236}">
+                <a16:creationId xmlns:a16="http://schemas.microsoft.com/office/drawing/2014/main" id="{732FE81B-92B8-4646-9F74-26CD3BC4D62E}"/>
               </a:ext>
             </a:extLst>
           </p:cNvPr>
@@ -7247,8 +7295,8 @@
         </p:nvSpPr>
         <p:spPr>
           <a:xfrm>
-            <a:off x="5640224" y="2555274"/>
-            <a:ext cx="3350276" cy="1661993"/>
+            <a:off x="5640224" y="1524217"/>
+            <a:ext cx="3173946" cy="830997"/>
           </a:xfrm>
           <a:prstGeom prst="rect">
             <a:avLst/>
@@ -7263,57 +7311,120 @@
           <a:p>
             <a:r>
               <a:rPr lang="en-US" altLang="ja-JP" dirty="0" err="1"/>
+              <a:t>enemy_θ</a:t>
+            </a:r>
+            <a:endParaRPr lang="en-US" altLang="ja-JP" dirty="0"/>
+          </a:p>
+          <a:p>
+            <a:r>
+              <a:rPr lang="en-US" altLang="ja-JP" dirty="0"/>
+              <a:t> = </a:t>
+            </a:r>
+            <a:r>
+              <a:rPr lang="en-US" altLang="ja-JP" dirty="0" smtClean="0"/>
+              <a:t>-</a:t>
+            </a:r>
+            <a:r>
+              <a:rPr lang="en-US" altLang="ja-JP" dirty="0"/>
+              <a:t>0.08390354 * </a:t>
+            </a:r>
+            <a:r>
+              <a:rPr lang="en-US" altLang="ja-JP" dirty="0" err="1"/>
+              <a:t>circle_x</a:t>
+            </a:r>
+            <a:endParaRPr lang="en-US" altLang="ja-JP" dirty="0"/>
+          </a:p>
+          <a:p>
+            <a:r>
+              <a:rPr lang="en-US" altLang="ja-JP" dirty="0"/>
+              <a:t>   </a:t>
+            </a:r>
+            <a:r>
+              <a:rPr lang="en-US" altLang="ja-JP" dirty="0" smtClean="0"/>
+              <a:t>+ 26.03749234111076 [</a:t>
+            </a:r>
+            <a:r>
+              <a:rPr lang="en-US" altLang="ja-JP" dirty="0" err="1" smtClean="0"/>
+              <a:t>deg</a:t>
+            </a:r>
+            <a:r>
+              <a:rPr lang="en-US" altLang="ja-JP" dirty="0" smtClean="0"/>
+              <a:t>]</a:t>
+            </a:r>
+            <a:endParaRPr lang="en-US" altLang="ja-JP" dirty="0"/>
+          </a:p>
+        </p:txBody>
+      </p:sp>
+      <p:sp>
+        <p:nvSpPr>
+          <p:cNvPr id="18" name="テキスト ボックス 17">
+            <a:extLst>
+              <a:ext uri="{FF2B5EF4-FFF2-40B4-BE49-F238E27FC236}">
+                <a16:creationId xmlns:a16="http://schemas.microsoft.com/office/drawing/2014/main" id="{07193705-06C1-48FA-927A-F93001A190E0}"/>
+              </a:ext>
+            </a:extLst>
+          </p:cNvPr>
+          <p:cNvSpPr txBox="1"/>
+          <p:nvPr/>
+        </p:nvSpPr>
+        <p:spPr>
+          <a:xfrm>
+            <a:off x="5640224" y="2467229"/>
+            <a:ext cx="3999493" cy="276999"/>
+          </a:xfrm>
+          <a:prstGeom prst="rect">
+            <a:avLst/>
+          </a:prstGeom>
+          <a:noFill/>
+        </p:spPr>
+        <p:txBody>
+          <a:bodyPr wrap="none" lIns="0" tIns="0" rIns="0" bIns="0" rtlCol="0">
+            <a:spAutoFit/>
+          </a:bodyPr>
+          <a:lstStyle/>
+          <a:p>
+            <a:r>
+              <a:rPr lang="en-US" altLang="ja-JP" dirty="0" err="1" smtClean="0"/>
+              <a:t>enemy_u</a:t>
+            </a:r>
+            <a:r>
+              <a:rPr lang="en-US" altLang="ja-JP" dirty="0" smtClean="0"/>
+              <a:t> </a:t>
+            </a:r>
+            <a:r>
+              <a:rPr lang="en-US" altLang="ja-JP" dirty="0"/>
+              <a:t>= </a:t>
+            </a:r>
+            <a:r>
+              <a:rPr lang="en-US" altLang="ja-JP" dirty="0" err="1" smtClean="0"/>
               <a:t>enemy_v</a:t>
             </a:r>
+            <a:r>
+              <a:rPr lang="en-US" altLang="ja-JP" dirty="0" smtClean="0"/>
+              <a:t> * tan(</a:t>
+            </a:r>
+            <a:r>
+              <a:rPr lang="en-US" altLang="ja-JP" dirty="0" err="1" smtClean="0"/>
+              <a:t>enemy_θ</a:t>
+            </a:r>
+            <a:r>
+              <a:rPr lang="en-US" altLang="ja-JP" dirty="0" smtClean="0"/>
+              <a:t>)</a:t>
+            </a:r>
             <a:endParaRPr lang="en-US" altLang="ja-JP" dirty="0"/>
           </a:p>
-          <a:p>
-            <a:r>
-              <a:rPr lang="en-US" altLang="ja-JP" dirty="0"/>
-              <a:t> = 4.58779425e-09 * circle_y^4</a:t>
-            </a:r>
-          </a:p>
-          <a:p>
-            <a:r>
-              <a:rPr lang="en-US" altLang="ja-JP" dirty="0"/>
-              <a:t>  - 1.14983273e-06 * circle_y^3</a:t>
-            </a:r>
-          </a:p>
-          <a:p>
-            <a:r>
-              <a:rPr lang="en-US" altLang="ja-JP" dirty="0"/>
-              <a:t>  + 1.21335973e-04 * circle_y^2</a:t>
-            </a:r>
-          </a:p>
-          <a:p>
-            <a:r>
-              <a:rPr lang="en-US" altLang="ja-JP" dirty="0"/>
-              <a:t>  - 7.94065667e-04 * </a:t>
-            </a:r>
-            <a:r>
-              <a:rPr lang="en-US" altLang="ja-JP" dirty="0" err="1"/>
-              <a:t>circle_y</a:t>
-            </a:r>
-            <a:endParaRPr lang="en-US" altLang="ja-JP" dirty="0"/>
-          </a:p>
-          <a:p>
-            <a:r>
-              <a:rPr lang="en-US" altLang="ja-JP" dirty="0"/>
-              <a:t>  + 0.5704722921109504</a:t>
-            </a:r>
-          </a:p>
-        </p:txBody>
-      </p:sp>
-      <p:sp>
-        <p:nvSpPr>
-          <p:cNvPr id="3" name="正方形/長方形 2"/>
+        </p:txBody>
+      </p:sp>
+      <p:sp>
+        <p:nvSpPr>
+          <p:cNvPr id="19" name="正方形/長方形 18"/>
           <p:cNvSpPr/>
           <p:nvPr/>
         </p:nvSpPr>
         <p:spPr>
           <a:xfrm>
-            <a:off x="5395784" y="1109609"/>
-            <a:ext cx="6532605" cy="3783667"/>
+            <a:off x="5395784" y="1175071"/>
+            <a:ext cx="6532605" cy="1695403"/>
           </a:xfrm>
           <a:prstGeom prst="rect">
             <a:avLst/>

</xml_diff>

<commit_message>
Update for amcl_pose coordinate
</commit_message>
<xml_diff>
--- a/circle/circle.pptx
+++ b/circle/circle.pptx
@@ -260,7 +260,7 @@
           <a:p>
             <a:fld id="{53864993-EA4D-4CF9-A73F-F1EAD087F599}" type="datetimeFigureOut">
               <a:rPr kumimoji="1" lang="ja-JP" altLang="en-US" smtClean="0"/>
-              <a:t>2019/8/19</a:t>
+              <a:t>2019/8/23</a:t>
             </a:fld>
             <a:endParaRPr kumimoji="1" lang="ja-JP" altLang="en-US"/>
           </a:p>
@@ -490,7 +490,7 @@
           <a:p>
             <a:fld id="{53864993-EA4D-4CF9-A73F-F1EAD087F599}" type="datetimeFigureOut">
               <a:rPr kumimoji="1" lang="ja-JP" altLang="en-US" smtClean="0"/>
-              <a:t>2019/8/19</a:t>
+              <a:t>2019/8/23</a:t>
             </a:fld>
             <a:endParaRPr kumimoji="1" lang="ja-JP" altLang="en-US"/>
           </a:p>
@@ -730,7 +730,7 @@
           <a:p>
             <a:fld id="{53864993-EA4D-4CF9-A73F-F1EAD087F599}" type="datetimeFigureOut">
               <a:rPr kumimoji="1" lang="ja-JP" altLang="en-US" smtClean="0"/>
-              <a:t>2019/8/19</a:t>
+              <a:t>2019/8/23</a:t>
             </a:fld>
             <a:endParaRPr kumimoji="1" lang="ja-JP" altLang="en-US"/>
           </a:p>
@@ -960,7 +960,7 @@
           <a:p>
             <a:fld id="{53864993-EA4D-4CF9-A73F-F1EAD087F599}" type="datetimeFigureOut">
               <a:rPr kumimoji="1" lang="ja-JP" altLang="en-US" smtClean="0"/>
-              <a:t>2019/8/19</a:t>
+              <a:t>2019/8/23</a:t>
             </a:fld>
             <a:endParaRPr kumimoji="1" lang="ja-JP" altLang="en-US"/>
           </a:p>
@@ -1235,7 +1235,7 @@
           <a:p>
             <a:fld id="{53864993-EA4D-4CF9-A73F-F1EAD087F599}" type="datetimeFigureOut">
               <a:rPr kumimoji="1" lang="ja-JP" altLang="en-US" smtClean="0"/>
-              <a:t>2019/8/19</a:t>
+              <a:t>2019/8/23</a:t>
             </a:fld>
             <a:endParaRPr kumimoji="1" lang="ja-JP" altLang="en-US"/>
           </a:p>
@@ -1564,7 +1564,7 @@
           <a:p>
             <a:fld id="{53864993-EA4D-4CF9-A73F-F1EAD087F599}" type="datetimeFigureOut">
               <a:rPr kumimoji="1" lang="ja-JP" altLang="en-US" smtClean="0"/>
-              <a:t>2019/8/19</a:t>
+              <a:t>2019/8/23</a:t>
             </a:fld>
             <a:endParaRPr kumimoji="1" lang="ja-JP" altLang="en-US"/>
           </a:p>
@@ -2040,7 +2040,7 @@
           <a:p>
             <a:fld id="{53864993-EA4D-4CF9-A73F-F1EAD087F599}" type="datetimeFigureOut">
               <a:rPr kumimoji="1" lang="ja-JP" altLang="en-US" smtClean="0"/>
-              <a:t>2019/8/19</a:t>
+              <a:t>2019/8/23</a:t>
             </a:fld>
             <a:endParaRPr kumimoji="1" lang="ja-JP" altLang="en-US"/>
           </a:p>
@@ -2181,7 +2181,7 @@
           <a:p>
             <a:fld id="{53864993-EA4D-4CF9-A73F-F1EAD087F599}" type="datetimeFigureOut">
               <a:rPr kumimoji="1" lang="ja-JP" altLang="en-US" smtClean="0"/>
-              <a:t>2019/8/19</a:t>
+              <a:t>2019/8/23</a:t>
             </a:fld>
             <a:endParaRPr kumimoji="1" lang="ja-JP" altLang="en-US"/>
           </a:p>
@@ -2294,7 +2294,7 @@
           <a:p>
             <a:fld id="{53864993-EA4D-4CF9-A73F-F1EAD087F599}" type="datetimeFigureOut">
               <a:rPr kumimoji="1" lang="ja-JP" altLang="en-US" smtClean="0"/>
-              <a:t>2019/8/19</a:t>
+              <a:t>2019/8/23</a:t>
             </a:fld>
             <a:endParaRPr kumimoji="1" lang="ja-JP" altLang="en-US"/>
           </a:p>
@@ -2637,7 +2637,7 @@
           <a:p>
             <a:fld id="{53864993-EA4D-4CF9-A73F-F1EAD087F599}" type="datetimeFigureOut">
               <a:rPr kumimoji="1" lang="ja-JP" altLang="en-US" smtClean="0"/>
-              <a:t>2019/8/19</a:t>
+              <a:t>2019/8/23</a:t>
             </a:fld>
             <a:endParaRPr kumimoji="1" lang="ja-JP" altLang="en-US"/>
           </a:p>
@@ -2925,7 +2925,7 @@
           <a:p>
             <a:fld id="{53864993-EA4D-4CF9-A73F-F1EAD087F599}" type="datetimeFigureOut">
               <a:rPr kumimoji="1" lang="ja-JP" altLang="en-US" smtClean="0"/>
-              <a:t>2019/8/19</a:t>
+              <a:t>2019/8/23</a:t>
             </a:fld>
             <a:endParaRPr kumimoji="1" lang="ja-JP" altLang="en-US"/>
           </a:p>
@@ -3198,7 +3198,7 @@
           <a:p>
             <a:fld id="{53864993-EA4D-4CF9-A73F-F1EAD087F599}" type="datetimeFigureOut">
               <a:rPr kumimoji="1" lang="ja-JP" altLang="en-US" smtClean="0"/>
-              <a:t>2019/8/19</a:t>
+              <a:t>2019/8/23</a:t>
             </a:fld>
             <a:endParaRPr kumimoji="1" lang="ja-JP" altLang="en-US"/>
           </a:p>
@@ -3726,7 +3726,8 @@
             <a:solidFill>
               <a:schemeClr val="tx1"/>
             </a:solidFill>
-            <a:tailEnd type="arrow" w="lg" len="lg"/>
+            <a:headEnd type="arrow"/>
+            <a:tailEnd type="none" w="lg" len="lg"/>
           </a:ln>
         </p:spPr>
         <p:style>
@@ -3801,11 +3802,11 @@
           <p:nvPr/>
         </p:nvGrpSpPr>
         <p:grpSpPr>
-          <a:xfrm rot="900000">
-            <a:off x="2201879" y="3678187"/>
-            <a:ext cx="405349" cy="659880"/>
-            <a:chOff x="7688712" y="1997924"/>
-            <a:chExt cx="405349" cy="659880"/>
+          <a:xfrm rot="19800000">
+            <a:off x="2575394" y="3247339"/>
+            <a:ext cx="405349" cy="655544"/>
+            <a:chOff x="7688712" y="2002262"/>
+            <a:chExt cx="405349" cy="655544"/>
           </a:xfrm>
         </p:grpSpPr>
         <p:sp>
@@ -3822,7 +3823,7 @@
           </p:nvSpPr>
           <p:spPr>
             <a:xfrm>
-              <a:off x="7688712" y="2252455"/>
+              <a:off x="7688712" y="2252457"/>
               <a:ext cx="405349" cy="405349"/>
             </a:xfrm>
             <a:prstGeom prst="rect">
@@ -3888,9 +3889,9 @@
             <p:nvPr/>
           </p:nvCxnSpPr>
           <p:spPr>
-            <a:xfrm flipH="1" flipV="1">
-              <a:off x="7891386" y="1997924"/>
-              <a:ext cx="1" cy="254531"/>
+            <a:xfrm rot="20700000" flipV="1">
+              <a:off x="7858448" y="2002262"/>
+              <a:ext cx="65878" cy="245858"/>
             </a:xfrm>
             <a:prstGeom prst="straightConnector1">
               <a:avLst/>
@@ -3984,7 +3985,7 @@
         </p:nvSpPr>
         <p:spPr>
           <a:xfrm>
-            <a:off x="4554096" y="2876904"/>
+            <a:off x="4859414" y="2876904"/>
             <a:ext cx="226243" cy="226243"/>
           </a:xfrm>
           <a:prstGeom prst="ellipse">
@@ -4093,7 +4094,7 @@
             <a:p>
               <a:pPr algn="ctr"/>
               <a:r>
-                <a:rPr kumimoji="1" lang="ja-JP" altLang="en-US">
+                <a:rPr kumimoji="1" lang="ja-JP" altLang="en-US" dirty="0">
                   <a:solidFill>
                     <a:schemeClr val="tx1"/>
                   </a:solidFill>
@@ -4255,8 +4256,8 @@
         </p:nvSpPr>
         <p:spPr>
           <a:xfrm>
-            <a:off x="3391026" y="3360041"/>
-            <a:ext cx="112210" cy="276999"/>
+            <a:off x="565630" y="3360041"/>
+            <a:ext cx="113814" cy="276999"/>
           </a:xfrm>
           <a:prstGeom prst="rect">
             <a:avLst/>
@@ -4270,8 +4271,8 @@
           <a:lstStyle/>
           <a:p>
             <a:r>
-              <a:rPr kumimoji="1" lang="en-US" altLang="ja-JP" dirty="0"/>
-              <a:t>x</a:t>
+              <a:rPr kumimoji="1" lang="en-US" altLang="ja-JP" dirty="0" smtClean="0"/>
+              <a:t>y</a:t>
             </a:r>
             <a:endParaRPr kumimoji="1" lang="ja-JP" altLang="en-US" dirty="0"/>
           </a:p>
@@ -4377,9 +4378,10 @@
           <a:lstStyle/>
           <a:p>
             <a:r>
-              <a:rPr kumimoji="1" lang="en-US" altLang="ja-JP"/>
-              <a:t>y</a:t>
-            </a:r>
+              <a:rPr kumimoji="1" lang="en-US" altLang="ja-JP" dirty="0" smtClean="0"/>
+              <a:t>x</a:t>
+            </a:r>
+            <a:endParaRPr kumimoji="1" lang="en-US" altLang="ja-JP" dirty="0"/>
           </a:p>
         </p:txBody>
       </p:sp>
@@ -4397,7 +4399,7 @@
         </p:nvSpPr>
         <p:spPr>
           <a:xfrm>
-            <a:off x="8268841" y="2838086"/>
+            <a:off x="8633302" y="2929636"/>
             <a:ext cx="931345" cy="246221"/>
           </a:xfrm>
           <a:prstGeom prst="rect">
@@ -4538,7 +4540,7 @@
         </p:nvSpPr>
         <p:spPr>
           <a:xfrm>
-            <a:off x="1861507" y="3719335"/>
+            <a:off x="1891339" y="3712323"/>
             <a:ext cx="127116" cy="276999"/>
           </a:xfrm>
           <a:prstGeom prst="rect">
@@ -4553,10 +4555,9 @@
           <a:lstStyle/>
           <a:p>
             <a:r>
-              <a:rPr kumimoji="1" lang="en-US" altLang="ja-JP"/>
+              <a:rPr kumimoji="1" lang="en-US" altLang="ja-JP" dirty="0"/>
               <a:t>0</a:t>
             </a:r>
-            <a:endParaRPr kumimoji="1" lang="en-US" altLang="ja-JP" dirty="0"/>
           </a:p>
         </p:txBody>
       </p:sp>
@@ -4611,8 +4612,8 @@
           <p:nvPr/>
         </p:nvCxnSpPr>
         <p:spPr>
-          <a:xfrm>
-            <a:off x="2075076" y="3928611"/>
+          <a:xfrm rot="5400000">
+            <a:off x="2034005" y="3347897"/>
             <a:ext cx="1428160" cy="0"/>
           </a:xfrm>
           <a:prstGeom prst="straightConnector1">
@@ -4655,11 +4656,14 @@
         </p:nvSpPr>
         <p:spPr>
           <a:xfrm>
-            <a:off x="2369013" y="3835958"/>
-            <a:ext cx="166409" cy="215679"/>
+            <a:off x="2614009" y="3368379"/>
+            <a:ext cx="308191" cy="315776"/>
           </a:xfrm>
           <a:prstGeom prst="arc">
-            <a:avLst/>
+            <a:avLst>
+              <a:gd name="adj1" fmla="val 13631571"/>
+              <a:gd name="adj2" fmla="val 16326346"/>
+            </a:avLst>
           </a:prstGeom>
           <a:ln>
             <a:solidFill>
@@ -4954,32 +4958,712 @@
           </a:fontRef>
         </p:style>
       </p:cxnSp>
+      <p:sp>
+        <p:nvSpPr>
+          <p:cNvPr id="44" name="テキスト ボックス 43">
+            <a:extLst>
+              <a:ext uri="{FF2B5EF4-FFF2-40B4-BE49-F238E27FC236}">
+                <a16:creationId xmlns:a16="http://schemas.microsoft.com/office/drawing/2014/main" id="{87369FEC-C436-412E-B219-BC353D689181}"/>
+              </a:ext>
+            </a:extLst>
+          </p:cNvPr>
+          <p:cNvSpPr txBox="1"/>
+          <p:nvPr/>
+        </p:nvSpPr>
+        <p:spPr>
+          <a:xfrm>
+            <a:off x="9827156" y="3436839"/>
+            <a:ext cx="134652" cy="276999"/>
+          </a:xfrm>
+          <a:prstGeom prst="rect">
+            <a:avLst/>
+          </a:prstGeom>
+          <a:noFill/>
+        </p:spPr>
+        <p:txBody>
+          <a:bodyPr wrap="none" lIns="0" tIns="0" rIns="0" bIns="0" rtlCol="0">
+            <a:spAutoFit/>
+          </a:bodyPr>
+          <a:lstStyle/>
+          <a:p>
+            <a:r>
+              <a:rPr kumimoji="1" lang="en-US" altLang="ja-JP" dirty="0"/>
+              <a:t>u</a:t>
+            </a:r>
+            <a:endParaRPr kumimoji="1" lang="ja-JP" altLang="en-US" dirty="0"/>
+          </a:p>
+        </p:txBody>
+      </p:sp>
+      <p:sp>
+        <p:nvSpPr>
+          <p:cNvPr id="45" name="テキスト ボックス 44">
+            <a:extLst>
+              <a:ext uri="{FF2B5EF4-FFF2-40B4-BE49-F238E27FC236}">
+                <a16:creationId xmlns:a16="http://schemas.microsoft.com/office/drawing/2014/main" id="{B878A274-2B4D-4362-9ECC-B8A87EF676FB}"/>
+              </a:ext>
+            </a:extLst>
+          </p:cNvPr>
+          <p:cNvSpPr txBox="1"/>
+          <p:nvPr/>
+        </p:nvSpPr>
+        <p:spPr>
+          <a:xfrm>
+            <a:off x="8576737" y="2225969"/>
+            <a:ext cx="123665" cy="276999"/>
+          </a:xfrm>
+          <a:prstGeom prst="rect">
+            <a:avLst/>
+          </a:prstGeom>
+          <a:noFill/>
+        </p:spPr>
+        <p:txBody>
+          <a:bodyPr wrap="square" lIns="0" tIns="0" rIns="0" bIns="0" rtlCol="0">
+            <a:spAutoFit/>
+          </a:bodyPr>
+          <a:lstStyle/>
+          <a:p>
+            <a:r>
+              <a:rPr kumimoji="1" lang="en-US" altLang="ja-JP" dirty="0"/>
+              <a:t>v</a:t>
+            </a:r>
+          </a:p>
+        </p:txBody>
+      </p:sp>
+      <p:sp>
+        <p:nvSpPr>
+          <p:cNvPr id="46" name="テキスト ボックス 45">
+            <a:extLst>
+              <a:ext uri="{FF2B5EF4-FFF2-40B4-BE49-F238E27FC236}">
+                <a16:creationId xmlns:a16="http://schemas.microsoft.com/office/drawing/2014/main" id="{1E2CF759-3721-4950-8D5E-BAD6B8667BA1}"/>
+              </a:ext>
+            </a:extLst>
+          </p:cNvPr>
+          <p:cNvSpPr txBox="1"/>
+          <p:nvPr/>
+        </p:nvSpPr>
+        <p:spPr>
+          <a:xfrm>
+            <a:off x="8316491" y="3814985"/>
+            <a:ext cx="127116" cy="276999"/>
+          </a:xfrm>
+          <a:prstGeom prst="rect">
+            <a:avLst/>
+          </a:prstGeom>
+          <a:noFill/>
+        </p:spPr>
+        <p:txBody>
+          <a:bodyPr wrap="square" lIns="0" tIns="0" rIns="0" bIns="0" rtlCol="0">
+            <a:spAutoFit/>
+          </a:bodyPr>
+          <a:lstStyle/>
+          <a:p>
+            <a:r>
+              <a:rPr kumimoji="1" lang="en-US" altLang="ja-JP" dirty="0"/>
+              <a:t>0</a:t>
+            </a:r>
+          </a:p>
+        </p:txBody>
+      </p:sp>
+      <p:sp>
+        <p:nvSpPr>
+          <p:cNvPr id="47" name="テキスト ボックス 46">
+            <a:extLst>
+              <a:ext uri="{FF2B5EF4-FFF2-40B4-BE49-F238E27FC236}">
+                <a16:creationId xmlns:a16="http://schemas.microsoft.com/office/drawing/2014/main" id="{4C9F3104-7097-42BF-B359-65F395D381DB}"/>
+              </a:ext>
+            </a:extLst>
+          </p:cNvPr>
+          <p:cNvSpPr txBox="1"/>
+          <p:nvPr/>
+        </p:nvSpPr>
+        <p:spPr>
+          <a:xfrm>
+            <a:off x="6958484" y="2009696"/>
+            <a:ext cx="2077492" cy="276999"/>
+          </a:xfrm>
+          <a:prstGeom prst="rect">
+            <a:avLst/>
+          </a:prstGeom>
+          <a:noFill/>
+        </p:spPr>
+        <p:txBody>
+          <a:bodyPr wrap="none" lIns="0" tIns="0" rIns="0" bIns="0" rtlCol="0">
+            <a:spAutoFit/>
+          </a:bodyPr>
+          <a:lstStyle/>
+          <a:p>
+            <a:r>
+              <a:rPr kumimoji="1" lang="ja-JP" altLang="en-US" dirty="0"/>
+              <a:t>自機から見た座標系</a:t>
+            </a:r>
+          </a:p>
+        </p:txBody>
+      </p:sp>
+      <p:sp>
+        <p:nvSpPr>
+          <p:cNvPr id="49" name="円弧 48">
+            <a:extLst>
+              <a:ext uri="{FF2B5EF4-FFF2-40B4-BE49-F238E27FC236}">
+                <a16:creationId xmlns:a16="http://schemas.microsoft.com/office/drawing/2014/main" id="{281F1271-1F0F-40BE-B43A-5A370DFA808B}"/>
+              </a:ext>
+            </a:extLst>
+          </p:cNvPr>
+          <p:cNvSpPr/>
+          <p:nvPr/>
+        </p:nvSpPr>
+        <p:spPr>
+          <a:xfrm>
+            <a:off x="7873084" y="3113640"/>
+            <a:ext cx="1089184" cy="1107962"/>
+          </a:xfrm>
+          <a:prstGeom prst="arc">
+            <a:avLst>
+              <a:gd name="adj1" fmla="val 15339120"/>
+              <a:gd name="adj2" fmla="val 16712652"/>
+            </a:avLst>
+          </a:prstGeom>
+          <a:ln>
+            <a:solidFill>
+              <a:schemeClr val="tx1"/>
+            </a:solidFill>
+            <a:headEnd type="arrow" w="lg" len="lg"/>
+          </a:ln>
+        </p:spPr>
+        <p:style>
+          <a:lnRef idx="1">
+            <a:schemeClr val="accent1"/>
+          </a:lnRef>
+          <a:fillRef idx="0">
+            <a:schemeClr val="accent1"/>
+          </a:fillRef>
+          <a:effectRef idx="0">
+            <a:schemeClr val="accent1"/>
+          </a:effectRef>
+          <a:fontRef idx="minor">
+            <a:schemeClr val="tx1"/>
+          </a:fontRef>
+        </p:style>
+        <p:txBody>
+          <a:bodyPr rtlCol="0" anchor="ctr"/>
+          <a:lstStyle/>
+          <a:p>
+            <a:pPr algn="ctr"/>
+            <a:endParaRPr kumimoji="1" lang="ja-JP" altLang="en-US"/>
+          </a:p>
+        </p:txBody>
+      </p:sp>
+      <p:sp>
+        <p:nvSpPr>
+          <p:cNvPr id="50" name="テキスト ボックス 49">
+            <a:extLst>
+              <a:ext uri="{FF2B5EF4-FFF2-40B4-BE49-F238E27FC236}">
+                <a16:creationId xmlns:a16="http://schemas.microsoft.com/office/drawing/2014/main" id="{3878E969-435C-4782-965A-AC2DABA8B37A}"/>
+              </a:ext>
+            </a:extLst>
+          </p:cNvPr>
+          <p:cNvSpPr txBox="1"/>
+          <p:nvPr/>
+        </p:nvSpPr>
+        <p:spPr>
+          <a:xfrm>
+            <a:off x="8512197" y="2534202"/>
+            <a:ext cx="1941237" cy="246221"/>
+          </a:xfrm>
+          <a:prstGeom prst="rect">
+            <a:avLst/>
+          </a:prstGeom>
+          <a:noFill/>
+        </p:spPr>
+        <p:txBody>
+          <a:bodyPr wrap="none" lIns="0" tIns="0" rIns="0" bIns="0" rtlCol="0">
+            <a:spAutoFit/>
+          </a:bodyPr>
+          <a:lstStyle/>
+          <a:p>
+            <a:r>
+              <a:rPr lang="en-US" altLang="ja-JP" sz="1600" dirty="0"/>
+              <a:t>(</a:t>
+            </a:r>
+            <a:r>
+              <a:rPr lang="en-US" altLang="ja-JP" sz="1600" dirty="0" err="1"/>
+              <a:t>enemy_u</a:t>
+            </a:r>
+            <a:r>
+              <a:rPr lang="en-US" altLang="ja-JP" sz="1600" dirty="0"/>
+              <a:t>, </a:t>
+            </a:r>
+            <a:r>
+              <a:rPr lang="en-US" altLang="ja-JP" sz="1600" dirty="0" err="1"/>
+              <a:t>enemy_v</a:t>
+            </a:r>
+            <a:r>
+              <a:rPr lang="en-US" altLang="ja-JP" sz="1600" dirty="0"/>
+              <a:t>)</a:t>
+            </a:r>
+            <a:endParaRPr kumimoji="1" lang="en-US" altLang="ja-JP" sz="1600" dirty="0"/>
+          </a:p>
+        </p:txBody>
+      </p:sp>
+      <p:sp>
+        <p:nvSpPr>
+          <p:cNvPr id="51" name="テキスト ボックス 50">
+            <a:extLst>
+              <a:ext uri="{FF2B5EF4-FFF2-40B4-BE49-F238E27FC236}">
+                <a16:creationId xmlns:a16="http://schemas.microsoft.com/office/drawing/2014/main" id="{3B953E0C-41EE-4314-9D3F-0C4B8C4F0DF0}"/>
+              </a:ext>
+            </a:extLst>
+          </p:cNvPr>
+          <p:cNvSpPr txBox="1"/>
+          <p:nvPr/>
+        </p:nvSpPr>
+        <p:spPr>
+          <a:xfrm>
+            <a:off x="2313849" y="2823696"/>
+            <a:ext cx="1449115" cy="184666"/>
+          </a:xfrm>
+          <a:prstGeom prst="rect">
+            <a:avLst/>
+          </a:prstGeom>
+          <a:noFill/>
+        </p:spPr>
+        <p:txBody>
+          <a:bodyPr wrap="none" lIns="0" tIns="0" rIns="0" bIns="0" rtlCol="0">
+            <a:spAutoFit/>
+          </a:bodyPr>
+          <a:lstStyle/>
+          <a:p>
+            <a:r>
+              <a:rPr lang="en-US" altLang="ja-JP" sz="1200" dirty="0"/>
+              <a:t>(</a:t>
+            </a:r>
+            <a:r>
+              <a:rPr lang="en-US" altLang="ja-JP" sz="1200" dirty="0" err="1"/>
+              <a:t>enemy_x</a:t>
+            </a:r>
+            <a:r>
+              <a:rPr lang="en-US" altLang="ja-JP" sz="1200" dirty="0"/>
+              <a:t>, </a:t>
+            </a:r>
+            <a:r>
+              <a:rPr lang="en-US" altLang="ja-JP" sz="1200" dirty="0" err="1"/>
+              <a:t>enemy_y</a:t>
+            </a:r>
+            <a:r>
+              <a:rPr lang="en-US" altLang="ja-JP" sz="1200" dirty="0"/>
+              <a:t>)</a:t>
+            </a:r>
+            <a:endParaRPr kumimoji="1" lang="en-US" altLang="ja-JP" sz="1200" dirty="0"/>
+          </a:p>
+        </p:txBody>
+      </p:sp>
+      <p:sp>
+        <p:nvSpPr>
+          <p:cNvPr id="52" name="テキスト ボックス 51">
+            <a:extLst>
+              <a:ext uri="{FF2B5EF4-FFF2-40B4-BE49-F238E27FC236}">
+                <a16:creationId xmlns:a16="http://schemas.microsoft.com/office/drawing/2014/main" id="{C76B546A-53D7-4CDF-BACD-E4E29C3839A8}"/>
+              </a:ext>
+            </a:extLst>
+          </p:cNvPr>
+          <p:cNvSpPr txBox="1"/>
+          <p:nvPr/>
+        </p:nvSpPr>
+        <p:spPr>
+          <a:xfrm>
+            <a:off x="2819976" y="3912583"/>
+            <a:ext cx="923330" cy="184666"/>
+          </a:xfrm>
+          <a:prstGeom prst="rect">
+            <a:avLst/>
+          </a:prstGeom>
+          <a:noFill/>
+        </p:spPr>
+        <p:txBody>
+          <a:bodyPr wrap="none" lIns="0" tIns="0" rIns="0" bIns="0" rtlCol="0">
+            <a:spAutoFit/>
+          </a:bodyPr>
+          <a:lstStyle/>
+          <a:p>
+            <a:r>
+              <a:rPr lang="en-US" altLang="ja-JP" sz="1200" dirty="0"/>
+              <a:t>(</a:t>
+            </a:r>
+            <a:r>
+              <a:rPr lang="en-US" altLang="ja-JP" sz="1200" dirty="0" err="1"/>
+              <a:t>my_x</a:t>
+            </a:r>
+            <a:r>
+              <a:rPr lang="en-US" altLang="ja-JP" sz="1200" dirty="0"/>
+              <a:t>, </a:t>
+            </a:r>
+            <a:r>
+              <a:rPr lang="en-US" altLang="ja-JP" sz="1200" dirty="0" err="1"/>
+              <a:t>my_y</a:t>
+            </a:r>
+            <a:r>
+              <a:rPr lang="en-US" altLang="ja-JP" sz="1200" dirty="0"/>
+              <a:t>)</a:t>
+            </a:r>
+            <a:endParaRPr kumimoji="1" lang="en-US" altLang="ja-JP" sz="1200" dirty="0"/>
+          </a:p>
+        </p:txBody>
+      </p:sp>
+      <p:sp>
+        <p:nvSpPr>
+          <p:cNvPr id="53" name="テキスト ボックス 52">
+            <a:extLst>
+              <a:ext uri="{FF2B5EF4-FFF2-40B4-BE49-F238E27FC236}">
+                <a16:creationId xmlns:a16="http://schemas.microsoft.com/office/drawing/2014/main" id="{10F36D74-37B7-4210-A325-92AAE165F006}"/>
+              </a:ext>
+            </a:extLst>
+          </p:cNvPr>
+          <p:cNvSpPr txBox="1"/>
+          <p:nvPr/>
+        </p:nvSpPr>
+        <p:spPr>
+          <a:xfrm>
+            <a:off x="4711084" y="3121566"/>
+            <a:ext cx="1272784" cy="184666"/>
+          </a:xfrm>
+          <a:prstGeom prst="rect">
+            <a:avLst/>
+          </a:prstGeom>
+          <a:noFill/>
+        </p:spPr>
+        <p:txBody>
+          <a:bodyPr wrap="none" lIns="0" tIns="0" rIns="0" bIns="0" rtlCol="0">
+            <a:spAutoFit/>
+          </a:bodyPr>
+          <a:lstStyle/>
+          <a:p>
+            <a:r>
+              <a:rPr lang="en-US" altLang="ja-JP" sz="1200" dirty="0"/>
+              <a:t>(</a:t>
+            </a:r>
+            <a:r>
+              <a:rPr lang="en-US" altLang="ja-JP" sz="1200" dirty="0" err="1"/>
+              <a:t>circle_x</a:t>
+            </a:r>
+            <a:r>
+              <a:rPr lang="en-US" altLang="ja-JP" sz="1200" dirty="0"/>
+              <a:t>, </a:t>
+            </a:r>
+            <a:r>
+              <a:rPr lang="en-US" altLang="ja-JP" sz="1200" dirty="0" err="1"/>
+              <a:t>circle_y</a:t>
+            </a:r>
+            <a:r>
+              <a:rPr lang="en-US" altLang="ja-JP" sz="1200" dirty="0"/>
+              <a:t>)</a:t>
+            </a:r>
+            <a:endParaRPr kumimoji="1" lang="en-US" altLang="ja-JP" sz="1200" dirty="0"/>
+          </a:p>
+        </p:txBody>
+      </p:sp>
+      <p:sp>
+        <p:nvSpPr>
+          <p:cNvPr id="54" name="テキスト ボックス 53">
+            <a:extLst>
+              <a:ext uri="{FF2B5EF4-FFF2-40B4-BE49-F238E27FC236}">
+                <a16:creationId xmlns:a16="http://schemas.microsoft.com/office/drawing/2014/main" id="{BBDD5ED9-C9DA-473F-A870-552D46A2E3E5}"/>
+              </a:ext>
+            </a:extLst>
+          </p:cNvPr>
+          <p:cNvSpPr txBox="1"/>
+          <p:nvPr/>
+        </p:nvSpPr>
+        <p:spPr>
+          <a:xfrm>
+            <a:off x="10153970" y="3140989"/>
+            <a:ext cx="1974900" cy="1077218"/>
+          </a:xfrm>
+          <a:prstGeom prst="rect">
+            <a:avLst/>
+          </a:prstGeom>
+          <a:noFill/>
+        </p:spPr>
+        <p:txBody>
+          <a:bodyPr wrap="none" lIns="0" tIns="0" rIns="0" bIns="0" rtlCol="0">
+            <a:spAutoFit/>
+          </a:bodyPr>
+          <a:lstStyle/>
+          <a:p>
+            <a:r>
+              <a:rPr lang="en-US" altLang="ja-JP" sz="1400" dirty="0"/>
+              <a:t>※</a:t>
+            </a:r>
+            <a:r>
+              <a:rPr lang="en-US" altLang="ja-JP" sz="1400" dirty="0" err="1"/>
+              <a:t>enemy_θ</a:t>
+            </a:r>
+            <a:r>
+              <a:rPr lang="ja-JP" altLang="en-US" sz="1400" dirty="0"/>
+              <a:t>は</a:t>
+            </a:r>
+            <a:endParaRPr lang="en-US" altLang="ja-JP" sz="1400" dirty="0"/>
+          </a:p>
+          <a:p>
+            <a:r>
+              <a:rPr kumimoji="1" lang="ja-JP" altLang="en-US" sz="1400" dirty="0"/>
+              <a:t>　</a:t>
+            </a:r>
+            <a:r>
+              <a:rPr kumimoji="1" lang="en-US" altLang="ja-JP" sz="1400" dirty="0"/>
+              <a:t>v</a:t>
+            </a:r>
+            <a:r>
+              <a:rPr kumimoji="1" lang="ja-JP" altLang="en-US" sz="1400" dirty="0"/>
+              <a:t>軸方向を</a:t>
+            </a:r>
+            <a:r>
+              <a:rPr kumimoji="1" lang="en-US" altLang="ja-JP" sz="1400" dirty="0"/>
+              <a:t>0</a:t>
+            </a:r>
+            <a:r>
+              <a:rPr kumimoji="1" lang="ja-JP" altLang="en-US" sz="1400" dirty="0"/>
+              <a:t>とし</a:t>
+            </a:r>
+            <a:endParaRPr kumimoji="1" lang="en-US" altLang="ja-JP" sz="1400" dirty="0"/>
+          </a:p>
+          <a:p>
+            <a:r>
+              <a:rPr lang="ja-JP" altLang="en-US" sz="1400" dirty="0"/>
+              <a:t>　反時計周りをプラス、</a:t>
+            </a:r>
+            <a:endParaRPr lang="en-US" altLang="ja-JP" sz="1400" dirty="0"/>
+          </a:p>
+          <a:p>
+            <a:r>
+              <a:rPr kumimoji="1" lang="ja-JP" altLang="en-US" sz="1400" dirty="0"/>
+              <a:t>　時計回りをマイナス</a:t>
+            </a:r>
+            <a:endParaRPr kumimoji="1" lang="en-US" altLang="ja-JP" sz="1400" dirty="0"/>
+          </a:p>
+          <a:p>
+            <a:r>
+              <a:rPr lang="ja-JP" altLang="en-US" sz="1400" dirty="0"/>
+              <a:t>　とする</a:t>
+            </a:r>
+            <a:endParaRPr kumimoji="1" lang="en-US" altLang="ja-JP" sz="1400" dirty="0"/>
+          </a:p>
+        </p:txBody>
+      </p:sp>
+      <p:sp>
+        <p:nvSpPr>
+          <p:cNvPr id="55" name="テキスト ボックス 54">
+            <a:extLst>
+              <a:ext uri="{FF2B5EF4-FFF2-40B4-BE49-F238E27FC236}">
+                <a16:creationId xmlns:a16="http://schemas.microsoft.com/office/drawing/2014/main" id="{86C471FE-FB3A-4145-85EB-0835B1F4F7E1}"/>
+              </a:ext>
+            </a:extLst>
+          </p:cNvPr>
+          <p:cNvSpPr txBox="1"/>
+          <p:nvPr/>
+        </p:nvSpPr>
+        <p:spPr>
+          <a:xfrm>
+            <a:off x="537257" y="5385416"/>
+            <a:ext cx="6453690" cy="553998"/>
+          </a:xfrm>
+          <a:prstGeom prst="rect">
+            <a:avLst/>
+          </a:prstGeom>
+          <a:noFill/>
+        </p:spPr>
+        <p:txBody>
+          <a:bodyPr wrap="none" lIns="0" tIns="0" rIns="0" bIns="0" rtlCol="0">
+            <a:spAutoFit/>
+          </a:bodyPr>
+          <a:lstStyle/>
+          <a:p>
+            <a:r>
+              <a:rPr lang="en-US" altLang="ja-JP" dirty="0" err="1"/>
+              <a:t>my_x</a:t>
+            </a:r>
+            <a:r>
+              <a:rPr lang="en-US" altLang="ja-JP" dirty="0"/>
+              <a:t>, </a:t>
+            </a:r>
+            <a:r>
+              <a:rPr lang="en-US" altLang="ja-JP" dirty="0" err="1"/>
+              <a:t>my_y</a:t>
+            </a:r>
+            <a:r>
+              <a:rPr lang="en-US" altLang="ja-JP" dirty="0"/>
+              <a:t>, </a:t>
+            </a:r>
+            <a:r>
+              <a:rPr lang="en-US" altLang="ja-JP" dirty="0" err="1"/>
+              <a:t>my_az</a:t>
+            </a:r>
+            <a:r>
+              <a:rPr lang="en-US" altLang="ja-JP" dirty="0"/>
+              <a:t>, </a:t>
+            </a:r>
+            <a:r>
+              <a:rPr kumimoji="1" lang="en-US" altLang="ja-JP" dirty="0" err="1"/>
+              <a:t>circle_x</a:t>
+            </a:r>
+            <a:r>
+              <a:rPr kumimoji="1" lang="en-US" altLang="ja-JP" dirty="0"/>
+              <a:t>, </a:t>
+            </a:r>
+            <a:r>
+              <a:rPr kumimoji="1" lang="en-US" altLang="ja-JP" dirty="0" err="1"/>
+              <a:t>circle_y</a:t>
+            </a:r>
+            <a:r>
+              <a:rPr kumimoji="1" lang="ja-JP" altLang="en-US" dirty="0"/>
+              <a:t>が与えられたとき、</a:t>
+            </a:r>
+            <a:endParaRPr kumimoji="1" lang="en-US" altLang="ja-JP" dirty="0"/>
+          </a:p>
+          <a:p>
+            <a:r>
+              <a:rPr lang="en-US" altLang="ja-JP" dirty="0" err="1"/>
+              <a:t>enemy_u</a:t>
+            </a:r>
+            <a:r>
+              <a:rPr lang="en-US" altLang="ja-JP" dirty="0"/>
+              <a:t>, </a:t>
+            </a:r>
+            <a:r>
+              <a:rPr lang="en-US" altLang="ja-JP" dirty="0" err="1"/>
+              <a:t>enemy_v</a:t>
+            </a:r>
+            <a:r>
+              <a:rPr lang="en-US" altLang="ja-JP" dirty="0"/>
+              <a:t>, </a:t>
+            </a:r>
+            <a:r>
+              <a:rPr lang="en-US" altLang="ja-JP" dirty="0" err="1"/>
+              <a:t>enemy_θ</a:t>
+            </a:r>
+            <a:r>
+              <a:rPr lang="en-US" altLang="ja-JP" dirty="0"/>
+              <a:t>, </a:t>
+            </a:r>
+            <a:r>
+              <a:rPr lang="en-US" altLang="ja-JP" dirty="0" err="1"/>
+              <a:t>enemy_x</a:t>
+            </a:r>
+            <a:r>
+              <a:rPr lang="en-US" altLang="ja-JP" dirty="0"/>
+              <a:t>, </a:t>
+            </a:r>
+            <a:r>
+              <a:rPr lang="en-US" altLang="ja-JP" dirty="0" err="1"/>
+              <a:t>enemy_y</a:t>
+            </a:r>
+            <a:r>
+              <a:rPr lang="ja-JP" altLang="en-US" dirty="0"/>
+              <a:t>を推定する</a:t>
+            </a:r>
+          </a:p>
+        </p:txBody>
+      </p:sp>
+      <p:sp>
+        <p:nvSpPr>
+          <p:cNvPr id="57" name="テキスト ボックス 56">
+            <a:extLst>
+              <a:ext uri="{FF2B5EF4-FFF2-40B4-BE49-F238E27FC236}">
+                <a16:creationId xmlns:a16="http://schemas.microsoft.com/office/drawing/2014/main" id="{2F8D9063-8811-4CB4-AA7D-334C862852CA}"/>
+              </a:ext>
+            </a:extLst>
+          </p:cNvPr>
+          <p:cNvSpPr txBox="1"/>
+          <p:nvPr/>
+        </p:nvSpPr>
+        <p:spPr>
+          <a:xfrm>
+            <a:off x="2666245" y="3177631"/>
+            <a:ext cx="403957" cy="169277"/>
+          </a:xfrm>
+          <a:prstGeom prst="rect">
+            <a:avLst/>
+          </a:prstGeom>
+          <a:noFill/>
+        </p:spPr>
+        <p:txBody>
+          <a:bodyPr wrap="none" lIns="0" tIns="0" rIns="0" bIns="0" rtlCol="0">
+            <a:spAutoFit/>
+          </a:bodyPr>
+          <a:lstStyle/>
+          <a:p>
+            <a:r>
+              <a:rPr lang="en-US" altLang="ja-JP" sz="1100" dirty="0" err="1"/>
+              <a:t>my_az</a:t>
+            </a:r>
+            <a:endParaRPr kumimoji="1" lang="en-US" altLang="ja-JP" sz="1100" dirty="0"/>
+          </a:p>
+        </p:txBody>
+      </p:sp>
+      <p:cxnSp>
+        <p:nvCxnSpPr>
+          <p:cNvPr id="69" name="直線矢印コネクタ 68">
+            <a:extLst>
+              <a:ext uri="{FF2B5EF4-FFF2-40B4-BE49-F238E27FC236}">
+                <a16:creationId xmlns:a16="http://schemas.microsoft.com/office/drawing/2014/main" id="{1EB1AE42-4651-4D01-BA98-6BBDC2FC333B}"/>
+              </a:ext>
+            </a:extLst>
+          </p:cNvPr>
+          <p:cNvCxnSpPr>
+            <a:cxnSpLocks/>
+            <a:stCxn id="47" idx="2"/>
+          </p:cNvCxnSpPr>
+          <p:nvPr/>
+        </p:nvCxnSpPr>
+        <p:spPr>
+          <a:xfrm>
+            <a:off x="7997230" y="2286695"/>
+            <a:ext cx="499515" cy="1391478"/>
+          </a:xfrm>
+          <a:prstGeom prst="straightConnector1">
+            <a:avLst/>
+          </a:prstGeom>
+          <a:ln>
+            <a:solidFill>
+              <a:schemeClr val="tx1"/>
+            </a:solidFill>
+            <a:prstDash val="dash"/>
+            <a:tailEnd type="none" w="lg" len="lg"/>
+          </a:ln>
+        </p:spPr>
+        <p:style>
+          <a:lnRef idx="1">
+            <a:schemeClr val="accent1"/>
+          </a:lnRef>
+          <a:fillRef idx="0">
+            <a:schemeClr val="accent1"/>
+          </a:fillRef>
+          <a:effectRef idx="0">
+            <a:schemeClr val="accent1"/>
+          </a:effectRef>
+          <a:fontRef idx="minor">
+            <a:schemeClr val="tx1"/>
+          </a:fontRef>
+        </p:style>
+      </p:cxnSp>
       <p:grpSp>
         <p:nvGrpSpPr>
-          <p:cNvPr id="36" name="グループ化 35">
-            <a:extLst>
-              <a:ext uri="{FF2B5EF4-FFF2-40B4-BE49-F238E27FC236}">
-                <a16:creationId xmlns:a16="http://schemas.microsoft.com/office/drawing/2014/main" id="{4A53CD4A-6522-4000-968F-EE4F3A27F204}"/>
-              </a:ext>
-            </a:extLst>
-          </p:cNvPr>
+          <p:cNvPr id="80" name="グループ化 79"/>
           <p:cNvGrpSpPr/>
           <p:nvPr/>
         </p:nvGrpSpPr>
         <p:grpSpPr>
-          <a:xfrm rot="20700000">
-            <a:off x="6953441" y="2275539"/>
+          <a:xfrm rot="1800000">
+            <a:off x="6703453" y="2231197"/>
             <a:ext cx="2223037" cy="2185888"/>
-            <a:chOff x="6958755" y="4271475"/>
+            <a:chOff x="5700720" y="-122840"/>
             <a:chExt cx="2223037" cy="2185888"/>
           </a:xfrm>
         </p:grpSpPr>
         <p:sp>
           <p:nvSpPr>
-            <p:cNvPr id="37" name="フローチャート: 判断 36">
+            <p:cNvPr id="73" name="フローチャート: 判断 72">
               <a:extLst>
                 <a:ext uri="{FF2B5EF4-FFF2-40B4-BE49-F238E27FC236}">
-                  <a16:creationId xmlns:a16="http://schemas.microsoft.com/office/drawing/2014/main" id="{F42A4B07-4D1C-4988-A41F-3D9245E1DDEE}"/>
+                  <a16:creationId xmlns:a16="http://schemas.microsoft.com/office/drawing/2014/main" id="{BB13D5F3-F8EC-420A-9F69-282FDEBD8536}"/>
                 </a:ext>
               </a:extLst>
             </p:cNvPr>
@@ -4988,7 +5672,7 @@
           </p:nvSpPr>
           <p:spPr>
             <a:xfrm>
-              <a:off x="6958755" y="4271475"/>
+              <a:off x="5700720" y="-122840"/>
               <a:ext cx="2223037" cy="2185888"/>
             </a:xfrm>
             <a:prstGeom prst="flowChartDecision">
@@ -5028,10 +5712,10 @@
         </p:sp>
         <p:grpSp>
           <p:nvGrpSpPr>
-            <p:cNvPr id="38" name="グループ化 37">
+            <p:cNvPr id="74" name="グループ化 73">
               <a:extLst>
                 <a:ext uri="{FF2B5EF4-FFF2-40B4-BE49-F238E27FC236}">
-                  <a16:creationId xmlns:a16="http://schemas.microsoft.com/office/drawing/2014/main" id="{86F9B76D-0F93-4A81-B85B-F08618CF8CF3}"/>
+                  <a16:creationId xmlns:a16="http://schemas.microsoft.com/office/drawing/2014/main" id="{8F07CC2A-826E-4271-83B0-09314B30CA37}"/>
                 </a:ext>
               </a:extLst>
             </p:cNvPr>
@@ -5039,19 +5723,19 @@
             <p:nvPr/>
           </p:nvGrpSpPr>
           <p:grpSpPr>
-            <a:xfrm rot="900000">
-              <a:off x="8219114" y="5364419"/>
-              <a:ext cx="405349" cy="659880"/>
-              <a:chOff x="7688712" y="1997924"/>
-              <a:chExt cx="405349" cy="659880"/>
+            <a:xfrm rot="19800000">
+              <a:off x="7334594" y="539256"/>
+              <a:ext cx="405349" cy="655544"/>
+              <a:chOff x="7688712" y="2002262"/>
+              <a:chExt cx="405349" cy="655544"/>
             </a:xfrm>
           </p:grpSpPr>
           <p:sp>
             <p:nvSpPr>
-              <p:cNvPr id="42" name="正方形/長方形 41">
+              <p:cNvPr id="75" name="正方形/長方形 74">
                 <a:extLst>
                   <a:ext uri="{FF2B5EF4-FFF2-40B4-BE49-F238E27FC236}">
-                    <a16:creationId xmlns:a16="http://schemas.microsoft.com/office/drawing/2014/main" id="{090E707D-6515-45E0-9503-DF2AC05C11D2}"/>
+                    <a16:creationId xmlns:a16="http://schemas.microsoft.com/office/drawing/2014/main" id="{5548B189-8A03-4823-8180-1AE73880F538}"/>
                   </a:ext>
                 </a:extLst>
               </p:cNvPr>
@@ -5060,7 +5744,7 @@
             </p:nvSpPr>
             <p:spPr>
               <a:xfrm>
-                <a:off x="7688712" y="2252455"/>
+                <a:off x="7688712" y="2252457"/>
                 <a:ext cx="405349" cy="405349"/>
               </a:xfrm>
               <a:prstGeom prst="rect">
@@ -5112,23 +5796,23 @@
           </p:sp>
           <p:cxnSp>
             <p:nvCxnSpPr>
-              <p:cNvPr id="43" name="直線矢印コネクタ 42">
+              <p:cNvPr id="76" name="直線矢印コネクタ 75">
                 <a:extLst>
                   <a:ext uri="{FF2B5EF4-FFF2-40B4-BE49-F238E27FC236}">
-                    <a16:creationId xmlns:a16="http://schemas.microsoft.com/office/drawing/2014/main" id="{07B84844-65D1-4756-843F-1EE74BF1E42C}"/>
+                    <a16:creationId xmlns:a16="http://schemas.microsoft.com/office/drawing/2014/main" id="{9AE85066-11ED-4E2E-996D-7A31670DA23F}"/>
                   </a:ext>
                 </a:extLst>
               </p:cNvPr>
               <p:cNvCxnSpPr>
                 <a:cxnSpLocks/>
-                <a:stCxn id="42" idx="0"/>
+                <a:stCxn id="75" idx="0"/>
               </p:cNvCxnSpPr>
               <p:nvPr/>
             </p:nvCxnSpPr>
             <p:spPr>
-              <a:xfrm flipH="1" flipV="1">
-                <a:off x="7891386" y="1997924"/>
-                <a:ext cx="1" cy="254531"/>
+              <a:xfrm rot="20700000" flipV="1">
+                <a:off x="7858448" y="2002262"/>
+                <a:ext cx="65878" cy="245858"/>
               </a:xfrm>
               <a:prstGeom prst="straightConnector1">
                 <a:avLst/>
@@ -5158,10 +5842,10 @@
         </p:grpSp>
         <p:grpSp>
           <p:nvGrpSpPr>
-            <p:cNvPr id="39" name="グループ化 38">
+            <p:cNvPr id="77" name="グループ化 76">
               <a:extLst>
                 <a:ext uri="{FF2B5EF4-FFF2-40B4-BE49-F238E27FC236}">
-                  <a16:creationId xmlns:a16="http://schemas.microsoft.com/office/drawing/2014/main" id="{554868B5-FA83-4BBF-BC10-D17C9770065F}"/>
+                  <a16:creationId xmlns:a16="http://schemas.microsoft.com/office/drawing/2014/main" id="{725E87A5-C916-449D-A7A9-F96680B83B49}"/>
                 </a:ext>
               </a:extLst>
             </p:cNvPr>
@@ -5170,7 +5854,7 @@
           </p:nvGrpSpPr>
           <p:grpSpPr>
             <a:xfrm>
-              <a:off x="7864459" y="4464157"/>
+              <a:off x="6606424" y="69842"/>
               <a:ext cx="405349" cy="650450"/>
               <a:chOff x="7334057" y="1097662"/>
               <a:chExt cx="405349" cy="650450"/>
@@ -5178,10 +5862,10 @@
           </p:grpSpPr>
           <p:sp>
             <p:nvSpPr>
-              <p:cNvPr id="40" name="正方形/長方形 39">
+              <p:cNvPr id="78" name="正方形/長方形 77">
                 <a:extLst>
                   <a:ext uri="{FF2B5EF4-FFF2-40B4-BE49-F238E27FC236}">
-                    <a16:creationId xmlns:a16="http://schemas.microsoft.com/office/drawing/2014/main" id="{9A016971-7AED-4538-BBC8-17C703D39419}"/>
+                    <a16:creationId xmlns:a16="http://schemas.microsoft.com/office/drawing/2014/main" id="{56F3E8BE-9DC7-4BD8-A617-E7E8E417826C}"/>
                   </a:ext>
                 </a:extLst>
               </p:cNvPr>
@@ -5225,7 +5909,7 @@
               <a:p>
                 <a:pPr algn="ctr"/>
                 <a:r>
-                  <a:rPr kumimoji="1" lang="ja-JP" altLang="en-US">
+                  <a:rPr kumimoji="1" lang="ja-JP" altLang="en-US" dirty="0">
                     <a:solidFill>
                       <a:schemeClr val="tx1"/>
                     </a:solidFill>
@@ -5242,10 +5926,10 @@
           </p:sp>
           <p:cxnSp>
             <p:nvCxnSpPr>
-              <p:cNvPr id="41" name="直線矢印コネクタ 40">
+              <p:cNvPr id="79" name="直線矢印コネクタ 78">
                 <a:extLst>
                   <a:ext uri="{FF2B5EF4-FFF2-40B4-BE49-F238E27FC236}">
-                    <a16:creationId xmlns:a16="http://schemas.microsoft.com/office/drawing/2014/main" id="{0BB24AB3-BCBE-413C-815D-57EAF96DDC55}"/>
+                    <a16:creationId xmlns:a16="http://schemas.microsoft.com/office/drawing/2014/main" id="{61024E28-DB4A-4930-A2FF-097114ED0E85}"/>
                   </a:ext>
                 </a:extLst>
               </p:cNvPr>
@@ -5286,691 +5970,6 @@
           </p:cxnSp>
         </p:grpSp>
       </p:grpSp>
-      <p:sp>
-        <p:nvSpPr>
-          <p:cNvPr id="44" name="テキスト ボックス 43">
-            <a:extLst>
-              <a:ext uri="{FF2B5EF4-FFF2-40B4-BE49-F238E27FC236}">
-                <a16:creationId xmlns:a16="http://schemas.microsoft.com/office/drawing/2014/main" id="{87369FEC-C436-412E-B219-BC353D689181}"/>
-              </a:ext>
-            </a:extLst>
-          </p:cNvPr>
-          <p:cNvSpPr txBox="1"/>
-          <p:nvPr/>
-        </p:nvSpPr>
-        <p:spPr>
-          <a:xfrm>
-            <a:off x="9827156" y="3436839"/>
-            <a:ext cx="134652" cy="276999"/>
-          </a:xfrm>
-          <a:prstGeom prst="rect">
-            <a:avLst/>
-          </a:prstGeom>
-          <a:noFill/>
-        </p:spPr>
-        <p:txBody>
-          <a:bodyPr wrap="none" lIns="0" tIns="0" rIns="0" bIns="0" rtlCol="0">
-            <a:spAutoFit/>
-          </a:bodyPr>
-          <a:lstStyle/>
-          <a:p>
-            <a:r>
-              <a:rPr kumimoji="1" lang="en-US" altLang="ja-JP" dirty="0"/>
-              <a:t>u</a:t>
-            </a:r>
-            <a:endParaRPr kumimoji="1" lang="ja-JP" altLang="en-US" dirty="0"/>
-          </a:p>
-        </p:txBody>
-      </p:sp>
-      <p:sp>
-        <p:nvSpPr>
-          <p:cNvPr id="45" name="テキスト ボックス 44">
-            <a:extLst>
-              <a:ext uri="{FF2B5EF4-FFF2-40B4-BE49-F238E27FC236}">
-                <a16:creationId xmlns:a16="http://schemas.microsoft.com/office/drawing/2014/main" id="{B878A274-2B4D-4362-9ECC-B8A87EF676FB}"/>
-              </a:ext>
-            </a:extLst>
-          </p:cNvPr>
-          <p:cNvSpPr txBox="1"/>
-          <p:nvPr/>
-        </p:nvSpPr>
-        <p:spPr>
-          <a:xfrm>
-            <a:off x="8576737" y="2225969"/>
-            <a:ext cx="123665" cy="276999"/>
-          </a:xfrm>
-          <a:prstGeom prst="rect">
-            <a:avLst/>
-          </a:prstGeom>
-          <a:noFill/>
-        </p:spPr>
-        <p:txBody>
-          <a:bodyPr wrap="square" lIns="0" tIns="0" rIns="0" bIns="0" rtlCol="0">
-            <a:spAutoFit/>
-          </a:bodyPr>
-          <a:lstStyle/>
-          <a:p>
-            <a:r>
-              <a:rPr kumimoji="1" lang="en-US" altLang="ja-JP" dirty="0"/>
-              <a:t>v</a:t>
-            </a:r>
-          </a:p>
-        </p:txBody>
-      </p:sp>
-      <p:sp>
-        <p:nvSpPr>
-          <p:cNvPr id="46" name="テキスト ボックス 45">
-            <a:extLst>
-              <a:ext uri="{FF2B5EF4-FFF2-40B4-BE49-F238E27FC236}">
-                <a16:creationId xmlns:a16="http://schemas.microsoft.com/office/drawing/2014/main" id="{1E2CF759-3721-4950-8D5E-BAD6B8667BA1}"/>
-              </a:ext>
-            </a:extLst>
-          </p:cNvPr>
-          <p:cNvSpPr txBox="1"/>
-          <p:nvPr/>
-        </p:nvSpPr>
-        <p:spPr>
-          <a:xfrm>
-            <a:off x="8316491" y="3814985"/>
-            <a:ext cx="127116" cy="276999"/>
-          </a:xfrm>
-          <a:prstGeom prst="rect">
-            <a:avLst/>
-          </a:prstGeom>
-          <a:noFill/>
-        </p:spPr>
-        <p:txBody>
-          <a:bodyPr wrap="square" lIns="0" tIns="0" rIns="0" bIns="0" rtlCol="0">
-            <a:spAutoFit/>
-          </a:bodyPr>
-          <a:lstStyle/>
-          <a:p>
-            <a:r>
-              <a:rPr kumimoji="1" lang="en-US" altLang="ja-JP" dirty="0"/>
-              <a:t>0</a:t>
-            </a:r>
-          </a:p>
-        </p:txBody>
-      </p:sp>
-      <p:sp>
-        <p:nvSpPr>
-          <p:cNvPr id="47" name="テキスト ボックス 46">
-            <a:extLst>
-              <a:ext uri="{FF2B5EF4-FFF2-40B4-BE49-F238E27FC236}">
-                <a16:creationId xmlns:a16="http://schemas.microsoft.com/office/drawing/2014/main" id="{4C9F3104-7097-42BF-B359-65F395D381DB}"/>
-              </a:ext>
-            </a:extLst>
-          </p:cNvPr>
-          <p:cNvSpPr txBox="1"/>
-          <p:nvPr/>
-        </p:nvSpPr>
-        <p:spPr>
-          <a:xfrm>
-            <a:off x="6958484" y="2009696"/>
-            <a:ext cx="2077492" cy="276999"/>
-          </a:xfrm>
-          <a:prstGeom prst="rect">
-            <a:avLst/>
-          </a:prstGeom>
-          <a:noFill/>
-        </p:spPr>
-        <p:txBody>
-          <a:bodyPr wrap="none" lIns="0" tIns="0" rIns="0" bIns="0" rtlCol="0">
-            <a:spAutoFit/>
-          </a:bodyPr>
-          <a:lstStyle/>
-          <a:p>
-            <a:r>
-              <a:rPr kumimoji="1" lang="ja-JP" altLang="en-US" dirty="0"/>
-              <a:t>自機から見た座標系</a:t>
-            </a:r>
-          </a:p>
-        </p:txBody>
-      </p:sp>
-      <p:cxnSp>
-        <p:nvCxnSpPr>
-          <p:cNvPr id="48" name="直線矢印コネクタ 47">
-            <a:extLst>
-              <a:ext uri="{FF2B5EF4-FFF2-40B4-BE49-F238E27FC236}">
-                <a16:creationId xmlns:a16="http://schemas.microsoft.com/office/drawing/2014/main" id="{49F28EB1-D034-4E82-B52F-AB38DB6809B7}"/>
-              </a:ext>
-            </a:extLst>
-          </p:cNvPr>
-          <p:cNvCxnSpPr>
-            <a:cxnSpLocks/>
-          </p:cNvCxnSpPr>
-          <p:nvPr/>
-        </p:nvCxnSpPr>
-        <p:spPr>
-          <a:xfrm>
-            <a:off x="7862657" y="2675123"/>
-            <a:ext cx="638521" cy="1004446"/>
-          </a:xfrm>
-          <a:prstGeom prst="straightConnector1">
-            <a:avLst/>
-          </a:prstGeom>
-          <a:ln>
-            <a:solidFill>
-              <a:schemeClr val="tx1"/>
-            </a:solidFill>
-            <a:prstDash val="dash"/>
-            <a:tailEnd type="none" w="lg" len="lg"/>
-          </a:ln>
-        </p:spPr>
-        <p:style>
-          <a:lnRef idx="1">
-            <a:schemeClr val="accent1"/>
-          </a:lnRef>
-          <a:fillRef idx="0">
-            <a:schemeClr val="accent1"/>
-          </a:fillRef>
-          <a:effectRef idx="0">
-            <a:schemeClr val="accent1"/>
-          </a:effectRef>
-          <a:fontRef idx="minor">
-            <a:schemeClr val="tx1"/>
-          </a:fontRef>
-        </p:style>
-      </p:cxnSp>
-      <p:sp>
-        <p:nvSpPr>
-          <p:cNvPr id="49" name="円弧 48">
-            <a:extLst>
-              <a:ext uri="{FF2B5EF4-FFF2-40B4-BE49-F238E27FC236}">
-                <a16:creationId xmlns:a16="http://schemas.microsoft.com/office/drawing/2014/main" id="{281F1271-1F0F-40BE-B43A-5A370DFA808B}"/>
-              </a:ext>
-            </a:extLst>
-          </p:cNvPr>
-          <p:cNvSpPr/>
-          <p:nvPr/>
-        </p:nvSpPr>
-        <p:spPr>
-          <a:xfrm>
-            <a:off x="7862657" y="3188798"/>
-            <a:ext cx="1089184" cy="1012345"/>
-          </a:xfrm>
-          <a:prstGeom prst="arc">
-            <a:avLst>
-              <a:gd name="adj1" fmla="val 14887007"/>
-              <a:gd name="adj2" fmla="val 16712652"/>
-            </a:avLst>
-          </a:prstGeom>
-          <a:ln>
-            <a:solidFill>
-              <a:schemeClr val="tx1"/>
-            </a:solidFill>
-            <a:headEnd type="arrow" w="lg" len="lg"/>
-          </a:ln>
-        </p:spPr>
-        <p:style>
-          <a:lnRef idx="1">
-            <a:schemeClr val="accent1"/>
-          </a:lnRef>
-          <a:fillRef idx="0">
-            <a:schemeClr val="accent1"/>
-          </a:fillRef>
-          <a:effectRef idx="0">
-            <a:schemeClr val="accent1"/>
-          </a:effectRef>
-          <a:fontRef idx="minor">
-            <a:schemeClr val="tx1"/>
-          </a:fontRef>
-        </p:style>
-        <p:txBody>
-          <a:bodyPr rtlCol="0" anchor="ctr"/>
-          <a:lstStyle/>
-          <a:p>
-            <a:pPr algn="ctr"/>
-            <a:endParaRPr kumimoji="1" lang="ja-JP" altLang="en-US"/>
-          </a:p>
-        </p:txBody>
-      </p:sp>
-      <p:sp>
-        <p:nvSpPr>
-          <p:cNvPr id="50" name="テキスト ボックス 49">
-            <a:extLst>
-              <a:ext uri="{FF2B5EF4-FFF2-40B4-BE49-F238E27FC236}">
-                <a16:creationId xmlns:a16="http://schemas.microsoft.com/office/drawing/2014/main" id="{3878E969-435C-4782-965A-AC2DABA8B37A}"/>
-              </a:ext>
-            </a:extLst>
-          </p:cNvPr>
-          <p:cNvSpPr txBox="1"/>
-          <p:nvPr/>
-        </p:nvSpPr>
-        <p:spPr>
-          <a:xfrm>
-            <a:off x="8146506" y="2508141"/>
-            <a:ext cx="1941237" cy="246221"/>
-          </a:xfrm>
-          <a:prstGeom prst="rect">
-            <a:avLst/>
-          </a:prstGeom>
-          <a:noFill/>
-        </p:spPr>
-        <p:txBody>
-          <a:bodyPr wrap="none" lIns="0" tIns="0" rIns="0" bIns="0" rtlCol="0">
-            <a:spAutoFit/>
-          </a:bodyPr>
-          <a:lstStyle/>
-          <a:p>
-            <a:r>
-              <a:rPr lang="en-US" altLang="ja-JP" sz="1600" dirty="0"/>
-              <a:t>(</a:t>
-            </a:r>
-            <a:r>
-              <a:rPr lang="en-US" altLang="ja-JP" sz="1600" dirty="0" err="1"/>
-              <a:t>enemy_u</a:t>
-            </a:r>
-            <a:r>
-              <a:rPr lang="en-US" altLang="ja-JP" sz="1600" dirty="0"/>
-              <a:t>, </a:t>
-            </a:r>
-            <a:r>
-              <a:rPr lang="en-US" altLang="ja-JP" sz="1600" dirty="0" err="1"/>
-              <a:t>enemy_v</a:t>
-            </a:r>
-            <a:r>
-              <a:rPr lang="en-US" altLang="ja-JP" sz="1600" dirty="0"/>
-              <a:t>)</a:t>
-            </a:r>
-            <a:endParaRPr kumimoji="1" lang="en-US" altLang="ja-JP" sz="1600" dirty="0"/>
-          </a:p>
-        </p:txBody>
-      </p:sp>
-      <p:sp>
-        <p:nvSpPr>
-          <p:cNvPr id="51" name="テキスト ボックス 50">
-            <a:extLst>
-              <a:ext uri="{FF2B5EF4-FFF2-40B4-BE49-F238E27FC236}">
-                <a16:creationId xmlns:a16="http://schemas.microsoft.com/office/drawing/2014/main" id="{3B953E0C-41EE-4314-9D3F-0C4B8C4F0DF0}"/>
-              </a:ext>
-            </a:extLst>
-          </p:cNvPr>
-          <p:cNvSpPr txBox="1"/>
-          <p:nvPr/>
-        </p:nvSpPr>
-        <p:spPr>
-          <a:xfrm>
-            <a:off x="2313849" y="2823696"/>
-            <a:ext cx="1449115" cy="184666"/>
-          </a:xfrm>
-          <a:prstGeom prst="rect">
-            <a:avLst/>
-          </a:prstGeom>
-          <a:noFill/>
-        </p:spPr>
-        <p:txBody>
-          <a:bodyPr wrap="none" lIns="0" tIns="0" rIns="0" bIns="0" rtlCol="0">
-            <a:spAutoFit/>
-          </a:bodyPr>
-          <a:lstStyle/>
-          <a:p>
-            <a:r>
-              <a:rPr lang="en-US" altLang="ja-JP" sz="1200" dirty="0"/>
-              <a:t>(</a:t>
-            </a:r>
-            <a:r>
-              <a:rPr lang="en-US" altLang="ja-JP" sz="1200" dirty="0" err="1"/>
-              <a:t>enemy_x</a:t>
-            </a:r>
-            <a:r>
-              <a:rPr lang="en-US" altLang="ja-JP" sz="1200" dirty="0"/>
-              <a:t>, </a:t>
-            </a:r>
-            <a:r>
-              <a:rPr lang="en-US" altLang="ja-JP" sz="1200" dirty="0" err="1"/>
-              <a:t>enemy_y</a:t>
-            </a:r>
-            <a:r>
-              <a:rPr lang="en-US" altLang="ja-JP" sz="1200" dirty="0"/>
-              <a:t>)</a:t>
-            </a:r>
-            <a:endParaRPr kumimoji="1" lang="en-US" altLang="ja-JP" sz="1200" dirty="0"/>
-          </a:p>
-        </p:txBody>
-      </p:sp>
-      <p:sp>
-        <p:nvSpPr>
-          <p:cNvPr id="52" name="テキスト ボックス 51">
-            <a:extLst>
-              <a:ext uri="{FF2B5EF4-FFF2-40B4-BE49-F238E27FC236}">
-                <a16:creationId xmlns:a16="http://schemas.microsoft.com/office/drawing/2014/main" id="{C76B546A-53D7-4CDF-BACD-E4E29C3839A8}"/>
-              </a:ext>
-            </a:extLst>
-          </p:cNvPr>
-          <p:cNvSpPr txBox="1"/>
-          <p:nvPr/>
-        </p:nvSpPr>
-        <p:spPr>
-          <a:xfrm>
-            <a:off x="2553234" y="4323937"/>
-            <a:ext cx="923330" cy="184666"/>
-          </a:xfrm>
-          <a:prstGeom prst="rect">
-            <a:avLst/>
-          </a:prstGeom>
-          <a:noFill/>
-        </p:spPr>
-        <p:txBody>
-          <a:bodyPr wrap="none" lIns="0" tIns="0" rIns="0" bIns="0" rtlCol="0">
-            <a:spAutoFit/>
-          </a:bodyPr>
-          <a:lstStyle/>
-          <a:p>
-            <a:r>
-              <a:rPr lang="en-US" altLang="ja-JP" sz="1200" dirty="0"/>
-              <a:t>(</a:t>
-            </a:r>
-            <a:r>
-              <a:rPr lang="en-US" altLang="ja-JP" sz="1200" dirty="0" err="1"/>
-              <a:t>my_x</a:t>
-            </a:r>
-            <a:r>
-              <a:rPr lang="en-US" altLang="ja-JP" sz="1200" dirty="0"/>
-              <a:t>, </a:t>
-            </a:r>
-            <a:r>
-              <a:rPr lang="en-US" altLang="ja-JP" sz="1200" dirty="0" err="1"/>
-              <a:t>my_y</a:t>
-            </a:r>
-            <a:r>
-              <a:rPr lang="en-US" altLang="ja-JP" sz="1200" dirty="0"/>
-              <a:t>)</a:t>
-            </a:r>
-            <a:endParaRPr kumimoji="1" lang="en-US" altLang="ja-JP" sz="1200" dirty="0"/>
-          </a:p>
-        </p:txBody>
-      </p:sp>
-      <p:sp>
-        <p:nvSpPr>
-          <p:cNvPr id="53" name="テキスト ボックス 52">
-            <a:extLst>
-              <a:ext uri="{FF2B5EF4-FFF2-40B4-BE49-F238E27FC236}">
-                <a16:creationId xmlns:a16="http://schemas.microsoft.com/office/drawing/2014/main" id="{10F36D74-37B7-4210-A325-92AAE165F006}"/>
-              </a:ext>
-            </a:extLst>
-          </p:cNvPr>
-          <p:cNvSpPr txBox="1"/>
-          <p:nvPr/>
-        </p:nvSpPr>
-        <p:spPr>
-          <a:xfrm>
-            <a:off x="4711084" y="3121566"/>
-            <a:ext cx="1272784" cy="184666"/>
-          </a:xfrm>
-          <a:prstGeom prst="rect">
-            <a:avLst/>
-          </a:prstGeom>
-          <a:noFill/>
-        </p:spPr>
-        <p:txBody>
-          <a:bodyPr wrap="none" lIns="0" tIns="0" rIns="0" bIns="0" rtlCol="0">
-            <a:spAutoFit/>
-          </a:bodyPr>
-          <a:lstStyle/>
-          <a:p>
-            <a:r>
-              <a:rPr lang="en-US" altLang="ja-JP" sz="1200" dirty="0"/>
-              <a:t>(</a:t>
-            </a:r>
-            <a:r>
-              <a:rPr lang="en-US" altLang="ja-JP" sz="1200" dirty="0" err="1"/>
-              <a:t>circle_x</a:t>
-            </a:r>
-            <a:r>
-              <a:rPr lang="en-US" altLang="ja-JP" sz="1200" dirty="0"/>
-              <a:t>, </a:t>
-            </a:r>
-            <a:r>
-              <a:rPr lang="en-US" altLang="ja-JP" sz="1200" dirty="0" err="1"/>
-              <a:t>circle_y</a:t>
-            </a:r>
-            <a:r>
-              <a:rPr lang="en-US" altLang="ja-JP" sz="1200" dirty="0"/>
-              <a:t>)</a:t>
-            </a:r>
-            <a:endParaRPr kumimoji="1" lang="en-US" altLang="ja-JP" sz="1200" dirty="0"/>
-          </a:p>
-        </p:txBody>
-      </p:sp>
-      <p:sp>
-        <p:nvSpPr>
-          <p:cNvPr id="54" name="テキスト ボックス 53">
-            <a:extLst>
-              <a:ext uri="{FF2B5EF4-FFF2-40B4-BE49-F238E27FC236}">
-                <a16:creationId xmlns:a16="http://schemas.microsoft.com/office/drawing/2014/main" id="{BBDD5ED9-C9DA-473F-A870-552D46A2E3E5}"/>
-              </a:ext>
-            </a:extLst>
-          </p:cNvPr>
-          <p:cNvSpPr txBox="1"/>
-          <p:nvPr/>
-        </p:nvSpPr>
-        <p:spPr>
-          <a:xfrm>
-            <a:off x="10153970" y="3140989"/>
-            <a:ext cx="1974900" cy="1077218"/>
-          </a:xfrm>
-          <a:prstGeom prst="rect">
-            <a:avLst/>
-          </a:prstGeom>
-          <a:noFill/>
-        </p:spPr>
-        <p:txBody>
-          <a:bodyPr wrap="none" lIns="0" tIns="0" rIns="0" bIns="0" rtlCol="0">
-            <a:spAutoFit/>
-          </a:bodyPr>
-          <a:lstStyle/>
-          <a:p>
-            <a:r>
-              <a:rPr lang="en-US" altLang="ja-JP" sz="1400" dirty="0"/>
-              <a:t>※</a:t>
-            </a:r>
-            <a:r>
-              <a:rPr lang="en-US" altLang="ja-JP" sz="1400" dirty="0" err="1"/>
-              <a:t>enemy_θ</a:t>
-            </a:r>
-            <a:r>
-              <a:rPr lang="ja-JP" altLang="en-US" sz="1400" dirty="0"/>
-              <a:t>は</a:t>
-            </a:r>
-            <a:endParaRPr lang="en-US" altLang="ja-JP" sz="1400" dirty="0"/>
-          </a:p>
-          <a:p>
-            <a:r>
-              <a:rPr kumimoji="1" lang="ja-JP" altLang="en-US" sz="1400" dirty="0"/>
-              <a:t>　</a:t>
-            </a:r>
-            <a:r>
-              <a:rPr kumimoji="1" lang="en-US" altLang="ja-JP" sz="1400" dirty="0"/>
-              <a:t>v</a:t>
-            </a:r>
-            <a:r>
-              <a:rPr kumimoji="1" lang="ja-JP" altLang="en-US" sz="1400" dirty="0"/>
-              <a:t>軸方向を</a:t>
-            </a:r>
-            <a:r>
-              <a:rPr kumimoji="1" lang="en-US" altLang="ja-JP" sz="1400" dirty="0"/>
-              <a:t>0</a:t>
-            </a:r>
-            <a:r>
-              <a:rPr kumimoji="1" lang="ja-JP" altLang="en-US" sz="1400" dirty="0"/>
-              <a:t>とし</a:t>
-            </a:r>
-            <a:endParaRPr kumimoji="1" lang="en-US" altLang="ja-JP" sz="1400" dirty="0"/>
-          </a:p>
-          <a:p>
-            <a:r>
-              <a:rPr lang="ja-JP" altLang="en-US" sz="1400" dirty="0"/>
-              <a:t>　反時計周りをプラス、</a:t>
-            </a:r>
-            <a:endParaRPr lang="en-US" altLang="ja-JP" sz="1400" dirty="0"/>
-          </a:p>
-          <a:p>
-            <a:r>
-              <a:rPr kumimoji="1" lang="ja-JP" altLang="en-US" sz="1400" dirty="0"/>
-              <a:t>　時計回りをマイナス</a:t>
-            </a:r>
-            <a:endParaRPr kumimoji="1" lang="en-US" altLang="ja-JP" sz="1400" dirty="0"/>
-          </a:p>
-          <a:p>
-            <a:r>
-              <a:rPr lang="ja-JP" altLang="en-US" sz="1400" dirty="0"/>
-              <a:t>　とする</a:t>
-            </a:r>
-            <a:endParaRPr kumimoji="1" lang="en-US" altLang="ja-JP" sz="1400" dirty="0"/>
-          </a:p>
-        </p:txBody>
-      </p:sp>
-      <p:sp>
-        <p:nvSpPr>
-          <p:cNvPr id="55" name="テキスト ボックス 54">
-            <a:extLst>
-              <a:ext uri="{FF2B5EF4-FFF2-40B4-BE49-F238E27FC236}">
-                <a16:creationId xmlns:a16="http://schemas.microsoft.com/office/drawing/2014/main" id="{86C471FE-FB3A-4145-85EB-0835B1F4F7E1}"/>
-              </a:ext>
-            </a:extLst>
-          </p:cNvPr>
-          <p:cNvSpPr txBox="1"/>
-          <p:nvPr/>
-        </p:nvSpPr>
-        <p:spPr>
-          <a:xfrm>
-            <a:off x="537257" y="5385416"/>
-            <a:ext cx="6453690" cy="553998"/>
-          </a:xfrm>
-          <a:prstGeom prst="rect">
-            <a:avLst/>
-          </a:prstGeom>
-          <a:noFill/>
-        </p:spPr>
-        <p:txBody>
-          <a:bodyPr wrap="none" lIns="0" tIns="0" rIns="0" bIns="0" rtlCol="0">
-            <a:spAutoFit/>
-          </a:bodyPr>
-          <a:lstStyle/>
-          <a:p>
-            <a:r>
-              <a:rPr lang="en-US" altLang="ja-JP" dirty="0" err="1"/>
-              <a:t>my_x</a:t>
-            </a:r>
-            <a:r>
-              <a:rPr lang="en-US" altLang="ja-JP" dirty="0"/>
-              <a:t>, </a:t>
-            </a:r>
-            <a:r>
-              <a:rPr lang="en-US" altLang="ja-JP" dirty="0" err="1"/>
-              <a:t>my_y</a:t>
-            </a:r>
-            <a:r>
-              <a:rPr lang="en-US" altLang="ja-JP" dirty="0"/>
-              <a:t>, </a:t>
-            </a:r>
-            <a:r>
-              <a:rPr lang="en-US" altLang="ja-JP" dirty="0" err="1"/>
-              <a:t>my_az</a:t>
-            </a:r>
-            <a:r>
-              <a:rPr lang="en-US" altLang="ja-JP" dirty="0"/>
-              <a:t>, </a:t>
-            </a:r>
-            <a:r>
-              <a:rPr kumimoji="1" lang="en-US" altLang="ja-JP" dirty="0" err="1"/>
-              <a:t>circle_x</a:t>
-            </a:r>
-            <a:r>
-              <a:rPr kumimoji="1" lang="en-US" altLang="ja-JP" dirty="0"/>
-              <a:t>, </a:t>
-            </a:r>
-            <a:r>
-              <a:rPr kumimoji="1" lang="en-US" altLang="ja-JP" dirty="0" err="1"/>
-              <a:t>circle_y</a:t>
-            </a:r>
-            <a:r>
-              <a:rPr kumimoji="1" lang="ja-JP" altLang="en-US" dirty="0"/>
-              <a:t>が与えられたとき、</a:t>
-            </a:r>
-            <a:endParaRPr kumimoji="1" lang="en-US" altLang="ja-JP" dirty="0"/>
-          </a:p>
-          <a:p>
-            <a:r>
-              <a:rPr lang="en-US" altLang="ja-JP" dirty="0" err="1"/>
-              <a:t>enemy_u</a:t>
-            </a:r>
-            <a:r>
-              <a:rPr lang="en-US" altLang="ja-JP" dirty="0"/>
-              <a:t>, </a:t>
-            </a:r>
-            <a:r>
-              <a:rPr lang="en-US" altLang="ja-JP" dirty="0" err="1"/>
-              <a:t>enemy_v</a:t>
-            </a:r>
-            <a:r>
-              <a:rPr lang="en-US" altLang="ja-JP" dirty="0"/>
-              <a:t>, </a:t>
-            </a:r>
-            <a:r>
-              <a:rPr lang="en-US" altLang="ja-JP" dirty="0" err="1"/>
-              <a:t>enemy_θ</a:t>
-            </a:r>
-            <a:r>
-              <a:rPr lang="en-US" altLang="ja-JP" dirty="0"/>
-              <a:t>, </a:t>
-            </a:r>
-            <a:r>
-              <a:rPr lang="en-US" altLang="ja-JP" dirty="0" err="1"/>
-              <a:t>enemy_x</a:t>
-            </a:r>
-            <a:r>
-              <a:rPr lang="en-US" altLang="ja-JP" dirty="0"/>
-              <a:t>, </a:t>
-            </a:r>
-            <a:r>
-              <a:rPr lang="en-US" altLang="ja-JP" dirty="0" err="1"/>
-              <a:t>enemy_y</a:t>
-            </a:r>
-            <a:r>
-              <a:rPr lang="ja-JP" altLang="en-US" dirty="0"/>
-              <a:t>を推定する</a:t>
-            </a:r>
-          </a:p>
-        </p:txBody>
-      </p:sp>
-      <p:sp>
-        <p:nvSpPr>
-          <p:cNvPr id="57" name="テキスト ボックス 56">
-            <a:extLst>
-              <a:ext uri="{FF2B5EF4-FFF2-40B4-BE49-F238E27FC236}">
-                <a16:creationId xmlns:a16="http://schemas.microsoft.com/office/drawing/2014/main" id="{2F8D9063-8811-4CB4-AA7D-334C862852CA}"/>
-              </a:ext>
-            </a:extLst>
-          </p:cNvPr>
-          <p:cNvSpPr txBox="1"/>
-          <p:nvPr/>
-        </p:nvSpPr>
-        <p:spPr>
-          <a:xfrm>
-            <a:off x="2560801" y="3762839"/>
-            <a:ext cx="403957" cy="169277"/>
-          </a:xfrm>
-          <a:prstGeom prst="rect">
-            <a:avLst/>
-          </a:prstGeom>
-          <a:noFill/>
-        </p:spPr>
-        <p:txBody>
-          <a:bodyPr wrap="none" lIns="0" tIns="0" rIns="0" bIns="0" rtlCol="0">
-            <a:spAutoFit/>
-          </a:bodyPr>
-          <a:lstStyle/>
-          <a:p>
-            <a:r>
-              <a:rPr lang="en-US" altLang="ja-JP" sz="1100" dirty="0" err="1"/>
-              <a:t>my_az</a:t>
-            </a:r>
-            <a:endParaRPr kumimoji="1" lang="en-US" altLang="ja-JP" sz="1100" dirty="0"/>
-          </a:p>
-        </p:txBody>
-      </p:sp>
     </p:spTree>
     <p:extLst>
       <p:ext uri="{BB962C8B-B14F-4D97-AF65-F5344CB8AC3E}">
@@ -6023,7 +6022,7 @@
           <a:lstStyle/>
           <a:p>
             <a:r>
-              <a:rPr lang="ja-JP" altLang="en-US"/>
+              <a:rPr lang="ja-JP" altLang="en-US" dirty="0"/>
               <a:t>推定式</a:t>
             </a:r>
             <a:endParaRPr kumimoji="1" lang="ja-JP" altLang="en-US" dirty="0"/>
@@ -6075,11 +6074,7 @@
             </a:r>
             <a:r>
               <a:rPr lang="en-US" altLang="ja-JP" dirty="0" smtClean="0"/>
-              <a:t>(</a:t>
-            </a:r>
-            <a:r>
-              <a:rPr lang="en-US" altLang="ja-JP" dirty="0" smtClean="0"/>
-              <a:t>-0.00143584 * </a:t>
+              <a:t>(-0.00143584 * </a:t>
             </a:r>
             <a:r>
               <a:rPr lang="en-US" altLang="ja-JP" dirty="0" err="1" smtClean="0"/>
@@ -6111,7 +6106,7 @@
         <p:spPr>
           <a:xfrm>
             <a:off x="1073039" y="2467229"/>
-            <a:ext cx="3999493" cy="276999"/>
+            <a:ext cx="4100481" cy="276999"/>
           </a:xfrm>
           <a:prstGeom prst="rect">
             <a:avLst/>
@@ -6137,12 +6132,24 @@
               <a:t>= </a:t>
             </a:r>
             <a:r>
+              <a:rPr lang="en-US" altLang="ja-JP" dirty="0" smtClean="0"/>
+              <a:t>-</a:t>
+            </a:r>
+            <a:r>
               <a:rPr lang="en-US" altLang="ja-JP" dirty="0" err="1" smtClean="0"/>
               <a:t>enemy_v</a:t>
             </a:r>
             <a:r>
               <a:rPr lang="en-US" altLang="ja-JP" dirty="0" smtClean="0"/>
-              <a:t> * tan(</a:t>
+              <a:t> </a:t>
+            </a:r>
+            <a:r>
+              <a:rPr lang="en-US" altLang="ja-JP" dirty="0" smtClean="0"/>
+              <a:t>* </a:t>
+            </a:r>
+            <a:r>
+              <a:rPr lang="en-US" altLang="ja-JP" dirty="0" smtClean="0"/>
+              <a:t>tan(</a:t>
             </a:r>
             <a:r>
               <a:rPr lang="en-US" altLang="ja-JP" dirty="0" err="1" smtClean="0"/>
@@ -6227,8 +6234,8 @@
           </a:p>
         </p:txBody>
       </p:sp>
-      <mc:AlternateContent xmlns:mc="http://schemas.openxmlformats.org/markup-compatibility/2006" xmlns:a14="http://schemas.microsoft.com/office/drawing/2010/main">
-        <mc:Choice Requires="a14">
+      <mc:AlternateContent xmlns:mc="http://schemas.openxmlformats.org/markup-compatibility/2006">
+        <mc:Choice xmlns:a14="http://schemas.microsoft.com/office/drawing/2010/main" Requires="a14">
           <p:sp>
             <p:nvSpPr>
               <p:cNvPr id="12" name="テキスト ボックス 11">
@@ -6243,7 +6250,7 @@
             </p:nvSpPr>
             <p:spPr>
               <a:xfrm>
-                <a:off x="948583" y="5915906"/>
+                <a:off x="948583" y="5999254"/>
                 <a:ext cx="3176702" cy="514756"/>
               </a:xfrm>
               <a:prstGeom prst="rect">
@@ -6513,7 +6520,7 @@
             </p:txBody>
           </p:sp>
         </mc:Choice>
-        <mc:Fallback xmlns="">
+        <mc:Fallback>
           <p:sp>
             <p:nvSpPr>
               <p:cNvPr id="12" name="テキスト ボックス 11">
@@ -6530,7 +6537,7 @@
             </p:nvSpPr>
             <p:spPr>
               <a:xfrm>
-                <a:off x="948583" y="5915906"/>
+                <a:off x="948583" y="5999254"/>
                 <a:ext cx="3176702" cy="514756"/>
               </a:xfrm>
               <a:prstGeom prst="rect">
@@ -6558,8 +6565,8 @@
           </p:sp>
         </mc:Fallback>
       </mc:AlternateContent>
-      <mc:AlternateContent xmlns:mc="http://schemas.openxmlformats.org/markup-compatibility/2006" xmlns:a14="http://schemas.microsoft.com/office/drawing/2010/main">
-        <mc:Choice Requires="a14">
+      <mc:AlternateContent xmlns:mc="http://schemas.openxmlformats.org/markup-compatibility/2006">
+        <mc:Choice xmlns:a14="http://schemas.microsoft.com/office/drawing/2010/main" Requires="a14">
           <p:sp>
             <p:nvSpPr>
               <p:cNvPr id="13" name="テキスト ボックス 12">
@@ -6574,8 +6581,8 @@
             </p:nvSpPr>
             <p:spPr>
               <a:xfrm>
-                <a:off x="948583" y="5081853"/>
-                <a:ext cx="3788858" cy="520335"/>
+                <a:off x="948583" y="4814393"/>
+                <a:ext cx="3689728" cy="520335"/>
               </a:xfrm>
               <a:prstGeom prst="rect">
                 <a:avLst/>
@@ -6627,7 +6634,7 @@
                                   <a:rPr kumimoji="1" lang="en-US" altLang="ja-JP" b="0" i="1" smtClean="0">
                                     <a:latin typeface="Cambria Math" panose="02040503050406030204" pitchFamily="18" charset="0"/>
                                   </a:rPr>
-                                  <m:t>𝑑𝑥</m:t>
+                                  <m:t>𝑝</m:t>
                                 </m:r>
                                 <m:r>
                                   <a:rPr kumimoji="1" lang="en-US" altLang="ja-JP" b="0" i="1" smtClean="0">
@@ -6643,13 +6650,7 @@
                                   <a:rPr kumimoji="1" lang="en-US" altLang="ja-JP" b="0" i="1" smtClean="0">
                                     <a:latin typeface="Cambria Math" panose="02040503050406030204" pitchFamily="18" charset="0"/>
                                   </a:rPr>
-                                  <m:t> </m:t>
-                                </m:r>
-                                <m:r>
-                                  <a:rPr kumimoji="1" lang="en-US" altLang="ja-JP" b="0" i="1" smtClean="0">
-                                    <a:latin typeface="Cambria Math" panose="02040503050406030204" pitchFamily="18" charset="0"/>
-                                  </a:rPr>
-                                  <m:t>𝑑𝑦</m:t>
+                                  <m:t>𝑞</m:t>
                                 </m:r>
                               </m:e>
                             </m:mr>
@@ -6732,6 +6733,12 @@
                                 </m:func>
                               </m:e>
                               <m:e>
+                                <m:r>
+                                  <a:rPr kumimoji="1" lang="en-US" altLang="ja-JP" b="0" i="1" smtClean="0">
+                                    <a:latin typeface="Cambria Math" panose="02040503050406030204" pitchFamily="18" charset="0"/>
+                                  </a:rPr>
+                                  <m:t>−</m:t>
+                                </m:r>
                                 <m:func>
                                   <m:funcPr>
                                     <m:ctrlPr>
@@ -6773,12 +6780,6 @@
                                     </m:ctrlPr>
                                   </m:funcPr>
                                   <m:fName>
-                                    <m:r>
-                                      <a:rPr kumimoji="1" lang="en-US" altLang="ja-JP" b="0" i="0" smtClean="0">
-                                        <a:latin typeface="Cambria Math" panose="02040503050406030204" pitchFamily="18" charset="0"/>
-                                      </a:rPr>
-                                      <m:t>−</m:t>
-                                    </m:r>
                                     <m:r>
                                       <m:rPr>
                                         <m:sty m:val="p"/>
@@ -6913,7 +6914,7 @@
             </p:txBody>
           </p:sp>
         </mc:Choice>
-        <mc:Fallback xmlns="">
+        <mc:Fallback>
           <p:sp>
             <p:nvSpPr>
               <p:cNvPr id="13" name="テキスト ボックス 12">
@@ -6930,8 +6931,8 @@
             </p:nvSpPr>
             <p:spPr>
               <a:xfrm>
-                <a:off x="948583" y="5081853"/>
-                <a:ext cx="3788858" cy="520335"/>
+                <a:off x="948583" y="4814393"/>
+                <a:ext cx="3689728" cy="520335"/>
               </a:xfrm>
               <a:prstGeom prst="rect">
                 <a:avLst/>
@@ -6958,8 +6959,8 @@
           </p:sp>
         </mc:Fallback>
       </mc:AlternateContent>
-      <mc:AlternateContent xmlns:mc="http://schemas.openxmlformats.org/markup-compatibility/2006" xmlns:a14="http://schemas.microsoft.com/office/drawing/2010/main">
-        <mc:Choice Requires="a14">
+      <mc:AlternateContent xmlns:mc="http://schemas.openxmlformats.org/markup-compatibility/2006">
+        <mc:Choice xmlns:a14="http://schemas.microsoft.com/office/drawing/2010/main" Requires="a14">
           <p:sp>
             <p:nvSpPr>
               <p:cNvPr id="14" name="テキスト ボックス 13">
@@ -6974,8 +6975,8 @@
             </p:nvSpPr>
             <p:spPr>
               <a:xfrm>
-                <a:off x="5640224" y="5106700"/>
-                <a:ext cx="1654492" cy="470642"/>
+                <a:off x="4799537" y="4839240"/>
+                <a:ext cx="1186287" cy="276999"/>
               </a:xfrm>
               <a:prstGeom prst="rect">
                 <a:avLst/>
@@ -7007,37 +7008,6 @@
                         </a:rPr>
                         <m:t>=</m:t>
                       </m:r>
-                      <m:f>
-                        <m:fPr>
-                          <m:ctrlPr>
-                            <a:rPr kumimoji="1" lang="en-US" altLang="ja-JP" b="0" i="1" smtClean="0">
-                              <a:latin typeface="Cambria Math" panose="02040503050406030204" pitchFamily="18" charset="0"/>
-                            </a:rPr>
-                          </m:ctrlPr>
-                        </m:fPr>
-                        <m:num>
-                          <m:r>
-                            <a:rPr kumimoji="1" lang="en-US" altLang="ja-JP" b="0" i="1" smtClean="0">
-                              <a:latin typeface="Cambria Math" panose="02040503050406030204" pitchFamily="18" charset="0"/>
-                            </a:rPr>
-                            <m:t>𝜋</m:t>
-                          </m:r>
-                        </m:num>
-                        <m:den>
-                          <m:r>
-                            <a:rPr kumimoji="1" lang="en-US" altLang="ja-JP" b="0" i="1" smtClean="0">
-                              <a:latin typeface="Cambria Math" panose="02040503050406030204" pitchFamily="18" charset="0"/>
-                            </a:rPr>
-                            <m:t>2</m:t>
-                          </m:r>
-                        </m:den>
-                      </m:f>
-                      <m:r>
-                        <a:rPr kumimoji="1" lang="en-US" altLang="ja-JP" b="0" i="1" smtClean="0">
-                          <a:latin typeface="Cambria Math" panose="02040503050406030204" pitchFamily="18" charset="0"/>
-                        </a:rPr>
-                        <m:t> −</m:t>
-                      </m:r>
                       <m:r>
                         <a:rPr kumimoji="1" lang="en-US" altLang="ja-JP" b="0" i="1" smtClean="0">
                           <a:latin typeface="Cambria Math" panose="02040503050406030204" pitchFamily="18" charset="0"/>
@@ -7064,7 +7034,7 @@
             </p:txBody>
           </p:sp>
         </mc:Choice>
-        <mc:Fallback xmlns="">
+        <mc:Fallback>
           <p:sp>
             <p:nvSpPr>
               <p:cNvPr id="14" name="テキスト ボックス 13">
@@ -7081,8 +7051,8 @@
             </p:nvSpPr>
             <p:spPr>
               <a:xfrm>
-                <a:off x="5640224" y="5106700"/>
-                <a:ext cx="1654492" cy="470642"/>
+                <a:off x="4799537" y="4839240"/>
+                <a:ext cx="1186287" cy="276999"/>
               </a:xfrm>
               <a:prstGeom prst="rect">
                 <a:avLst/>
@@ -7090,7 +7060,7 @@
               <a:blipFill>
                 <a:blip r:embed="rId4"/>
                 <a:stretch>
-                  <a:fillRect/>
+                  <a:fillRect l="-5641" r="-1538" b="-33333"/>
                 </a:stretch>
               </a:blipFill>
             </p:spPr>
@@ -7123,7 +7093,7 @@
         </p:nvSpPr>
         <p:spPr>
           <a:xfrm>
-            <a:off x="5640224" y="3324442"/>
+            <a:off x="5985824" y="3324442"/>
             <a:ext cx="2537554" cy="830997"/>
           </a:xfrm>
           <a:prstGeom prst="rect">
@@ -7176,7 +7146,7 @@
         </p:nvSpPr>
         <p:spPr>
           <a:xfrm>
-            <a:off x="5640224" y="4267453"/>
+            <a:off x="5985824" y="4267453"/>
             <a:ext cx="6094617" cy="276999"/>
           </a:xfrm>
           <a:prstGeom prst="rect">
@@ -7225,8 +7195,8 @@
         </p:nvSpPr>
         <p:spPr>
           <a:xfrm>
-            <a:off x="5395784" y="3048000"/>
-            <a:ext cx="6532605" cy="1695403"/>
+            <a:off x="5741384" y="3048000"/>
+            <a:ext cx="6339057" cy="1695403"/>
           </a:xfrm>
           <a:prstGeom prst="rect">
             <a:avLst/>
@@ -7295,7 +7265,7 @@
         </p:nvSpPr>
         <p:spPr>
           <a:xfrm>
-            <a:off x="5640224" y="1524217"/>
+            <a:off x="5985824" y="1524217"/>
             <a:ext cx="3173946" cy="830997"/>
           </a:xfrm>
           <a:prstGeom prst="rect">
@@ -7369,8 +7339,8 @@
         </p:nvSpPr>
         <p:spPr>
           <a:xfrm>
-            <a:off x="5640224" y="2467229"/>
-            <a:ext cx="3999493" cy="276999"/>
+            <a:off x="5985824" y="2467229"/>
+            <a:ext cx="4100481" cy="276999"/>
           </a:xfrm>
           <a:prstGeom prst="rect">
             <a:avLst/>
@@ -7396,12 +7366,20 @@
               <a:t>= </a:t>
             </a:r>
             <a:r>
+              <a:rPr lang="en-US" altLang="ja-JP" dirty="0" smtClean="0"/>
+              <a:t>-</a:t>
+            </a:r>
+            <a:r>
               <a:rPr lang="en-US" altLang="ja-JP" dirty="0" err="1" smtClean="0"/>
               <a:t>enemy_v</a:t>
             </a:r>
             <a:r>
               <a:rPr lang="en-US" altLang="ja-JP" dirty="0" smtClean="0"/>
-              <a:t> * tan(</a:t>
+              <a:t> </a:t>
+            </a:r>
+            <a:r>
+              <a:rPr lang="en-US" altLang="ja-JP" dirty="0" smtClean="0"/>
+              <a:t>* tan(</a:t>
             </a:r>
             <a:r>
               <a:rPr lang="en-US" altLang="ja-JP" dirty="0" err="1" smtClean="0"/>
@@ -7415,16 +7393,221 @@
           </a:p>
         </p:txBody>
       </p:sp>
-      <p:sp>
-        <p:nvSpPr>
-          <p:cNvPr id="19" name="正方形/長方形 18"/>
+      <mc:AlternateContent xmlns:mc="http://schemas.openxmlformats.org/markup-compatibility/2006">
+        <mc:Choice xmlns:a14="http://schemas.microsoft.com/office/drawing/2010/main" Requires="a14">
+          <p:sp>
+            <p:nvSpPr>
+              <p:cNvPr id="16" name="テキスト ボックス 15">
+                <a:extLst>
+                  <a:ext uri="{FF2B5EF4-FFF2-40B4-BE49-F238E27FC236}">
+                    <a16:creationId xmlns:a16="http://schemas.microsoft.com/office/drawing/2014/main" id="{3A168067-1340-4FEC-B902-00969FEF2829}"/>
+                  </a:ext>
+                </a:extLst>
+              </p:cNvPr>
+              <p:cNvSpPr txBox="1"/>
+              <p:nvPr/>
+            </p:nvSpPr>
+            <p:spPr>
+              <a:xfrm>
+                <a:off x="948583" y="5409613"/>
+                <a:ext cx="1491819" cy="514756"/>
+              </a:xfrm>
+              <a:prstGeom prst="rect">
+                <a:avLst/>
+              </a:prstGeom>
+              <a:noFill/>
+            </p:spPr>
+            <p:txBody>
+              <a:bodyPr wrap="none" lIns="0" tIns="0" rIns="0" bIns="0" rtlCol="0">
+                <a:spAutoFit/>
+              </a:bodyPr>
+              <a:lstStyle/>
+              <a:p>
+                <a:pPr/>
+                <a14:m>
+                  <m:oMathPara xmlns:m="http://schemas.openxmlformats.org/officeDocument/2006/math">
+                    <m:oMathParaPr>
+                      <m:jc m:val="centerGroup"/>
+                    </m:oMathParaPr>
+                    <m:oMath xmlns:m="http://schemas.openxmlformats.org/officeDocument/2006/math">
+                      <m:d>
+                        <m:dPr>
+                          <m:ctrlPr>
+                            <a:rPr kumimoji="1" lang="en-US" altLang="ja-JP" b="0" i="1" smtClean="0">
+                              <a:latin typeface="Cambria Math" panose="02040503050406030204" pitchFamily="18" charset="0"/>
+                            </a:rPr>
+                          </m:ctrlPr>
+                        </m:dPr>
+                        <m:e>
+                          <m:m>
+                            <m:mPr>
+                              <m:plcHide m:val="on"/>
+                              <m:mcs>
+                                <m:mc>
+                                  <m:mcPr>
+                                    <m:count m:val="1"/>
+                                    <m:mcJc m:val="center"/>
+                                  </m:mcPr>
+                                </m:mc>
+                              </m:mcs>
+                              <m:ctrlPr>
+                                <a:rPr kumimoji="1" lang="en-US" altLang="ja-JP" b="0" i="1" smtClean="0">
+                                  <a:latin typeface="Cambria Math" panose="02040503050406030204" pitchFamily="18" charset="0"/>
+                                </a:rPr>
+                              </m:ctrlPr>
+                            </m:mPr>
+                            <m:mr>
+                              <m:e>
+                                <m:r>
+                                  <a:rPr kumimoji="1" lang="en-US" altLang="ja-JP" b="0" i="1" smtClean="0">
+                                    <a:latin typeface="Cambria Math" panose="02040503050406030204" pitchFamily="18" charset="0"/>
+                                  </a:rPr>
+                                  <m:t>𝑑𝑥</m:t>
+                                </m:r>
+                                <m:r>
+                                  <a:rPr kumimoji="1" lang="en-US" altLang="ja-JP" b="0" i="1" smtClean="0">
+                                    <a:latin typeface="Cambria Math" panose="02040503050406030204" pitchFamily="18" charset="0"/>
+                                  </a:rPr>
+                                  <m:t> </m:t>
+                                </m:r>
+                              </m:e>
+                            </m:mr>
+                            <m:mr>
+                              <m:e>
+                                <m:r>
+                                  <a:rPr kumimoji="1" lang="en-US" altLang="ja-JP" b="0" i="1" smtClean="0">
+                                    <a:latin typeface="Cambria Math" panose="02040503050406030204" pitchFamily="18" charset="0"/>
+                                  </a:rPr>
+                                  <m:t>𝑑𝑦</m:t>
+                                </m:r>
+                              </m:e>
+                            </m:mr>
+                          </m:m>
+                        </m:e>
+                      </m:d>
+                      <m:r>
+                        <a:rPr kumimoji="1" lang="en-US" altLang="ja-JP" b="0" i="1" smtClean="0">
+                          <a:latin typeface="Cambria Math" panose="02040503050406030204" pitchFamily="18" charset="0"/>
+                        </a:rPr>
+                        <m:t>= </m:t>
+                      </m:r>
+                      <m:d>
+                        <m:dPr>
+                          <m:ctrlPr>
+                            <a:rPr kumimoji="1" lang="en-US" altLang="ja-JP" b="0" i="1" smtClean="0">
+                              <a:latin typeface="Cambria Math" panose="02040503050406030204" pitchFamily="18" charset="0"/>
+                            </a:rPr>
+                          </m:ctrlPr>
+                        </m:dPr>
+                        <m:e>
+                          <m:m>
+                            <m:mPr>
+                              <m:mcs>
+                                <m:mc>
+                                  <m:mcPr>
+                                    <m:count m:val="1"/>
+                                    <m:mcJc m:val="center"/>
+                                  </m:mcPr>
+                                </m:mc>
+                              </m:mcs>
+                              <m:ctrlPr>
+                                <a:rPr kumimoji="1" lang="en-US" altLang="ja-JP" b="0" i="1" smtClean="0">
+                                  <a:latin typeface="Cambria Math" panose="02040503050406030204" pitchFamily="18" charset="0"/>
+                                </a:rPr>
+                              </m:ctrlPr>
+                            </m:mPr>
+                            <m:mr>
+                              <m:e>
+                                <m:r>
+                                  <a:rPr kumimoji="1" lang="en-US" altLang="ja-JP" b="0" i="1" smtClean="0">
+                                    <a:latin typeface="Cambria Math" panose="02040503050406030204" pitchFamily="18" charset="0"/>
+                                  </a:rPr>
+                                  <m:t>𝑞</m:t>
+                                </m:r>
+                              </m:e>
+                            </m:mr>
+                            <m:mr>
+                              <m:e>
+                                <m:r>
+                                  <a:rPr kumimoji="1" lang="en-US" altLang="ja-JP" b="0" i="1" smtClean="0">
+                                    <a:latin typeface="Cambria Math" panose="02040503050406030204" pitchFamily="18" charset="0"/>
+                                  </a:rPr>
+                                  <m:t>−</m:t>
+                                </m:r>
+                                <m:r>
+                                  <a:rPr kumimoji="1" lang="en-US" altLang="ja-JP" b="0" i="1" smtClean="0">
+                                    <a:latin typeface="Cambria Math" panose="02040503050406030204" pitchFamily="18" charset="0"/>
+                                  </a:rPr>
+                                  <m:t>𝑝</m:t>
+                                </m:r>
+                              </m:e>
+                            </m:mr>
+                          </m:m>
+                        </m:e>
+                      </m:d>
+                    </m:oMath>
+                  </m:oMathPara>
+                </a14:m>
+                <a:endParaRPr kumimoji="1" lang="en-US" altLang="ja-JP" b="0" dirty="0"/>
+              </a:p>
+            </p:txBody>
+          </p:sp>
+        </mc:Choice>
+        <mc:Fallback>
+          <p:sp>
+            <p:nvSpPr>
+              <p:cNvPr id="16" name="テキスト ボックス 15">
+                <a:extLst>
+                  <a:ext uri="{FF2B5EF4-FFF2-40B4-BE49-F238E27FC236}">
+                    <a16:creationId xmlns:a16="http://schemas.microsoft.com/office/drawing/2014/main" id="{3A168067-1340-4FEC-B902-00969FEF2829}"/>
+                  </a:ext>
+                </a:extLst>
+              </p:cNvPr>
+              <p:cNvSpPr txBox="1">
+                <a:spLocks noRot="1" noChangeAspect="1" noMove="1" noResize="1" noEditPoints="1" noAdjustHandles="1" noChangeArrowheads="1" noChangeShapeType="1" noTextEdit="1"/>
+              </p:cNvSpPr>
+              <p:nvPr/>
+            </p:nvSpPr>
+            <p:spPr>
+              <a:xfrm>
+                <a:off x="948583" y="5409613"/>
+                <a:ext cx="1491819" cy="514756"/>
+              </a:xfrm>
+              <a:prstGeom prst="rect">
+                <a:avLst/>
+              </a:prstGeom>
+              <a:blipFill>
+                <a:blip r:embed="rId5"/>
+                <a:stretch>
+                  <a:fillRect/>
+                </a:stretch>
+              </a:blipFill>
+            </p:spPr>
+            <p:txBody>
+              <a:bodyPr/>
+              <a:lstStyle/>
+              <a:p>
+                <a:r>
+                  <a:rPr lang="ja-JP" altLang="en-US">
+                    <a:noFill/>
+                  </a:rPr>
+                  <a:t> </a:t>
+                </a:r>
+              </a:p>
+            </p:txBody>
+          </p:sp>
+        </mc:Fallback>
+      </mc:AlternateContent>
+      <p:sp>
+        <p:nvSpPr>
+          <p:cNvPr id="20" name="正方形/長方形 19"/>
           <p:cNvSpPr/>
           <p:nvPr/>
         </p:nvSpPr>
         <p:spPr>
           <a:xfrm>
-            <a:off x="5395784" y="1175071"/>
-            <a:ext cx="6532605" cy="1695403"/>
+            <a:off x="5741384" y="1175071"/>
+            <a:ext cx="6339057" cy="1695403"/>
           </a:xfrm>
           <a:prstGeom prst="rect">
             <a:avLst/>

</xml_diff>